<commit_message>
docs: ppt 문서 수정
</commit_message>
<xml_diff>
--- a/기획/문서/유도 시스템.pptx
+++ b/기획/문서/유도 시스템.pptx
@@ -1,21 +1,19 @@
 
 <file path=ppt/presentation.xml><?xml version="1.0" encoding="utf-8"?>
-<p:presentation xmlns:r="http://schemas.openxmlformats.org/officeDocument/2006/relationships" xmlns:c="http://schemas.openxmlformats.org/drawingml/2006/chart" xmlns:a="http://schemas.openxmlformats.org/drawingml/2006/main" xmlns:dgm="http://schemas.openxmlformats.org/drawingml/2006/diagram" xmlns:dsp="http://schemas.microsoft.com/office/drawing/2008/diagram" xmlns:p="http://schemas.openxmlformats.org/presentationml/2006/main">
+<p:presentation xmlns:a="http://schemas.openxmlformats.org/drawingml/2006/main" xmlns:r="http://schemas.openxmlformats.org/officeDocument/2006/relationships" xmlns:p="http://schemas.openxmlformats.org/presentationml/2006/main">
   <p:sldMasterIdLst>
     <p:sldMasterId id="2147483673" r:id="rId1"/>
   </p:sldMasterIdLst>
   <p:sldIdLst>
     <p:sldId id="256" r:id="rId2"/>
     <p:sldId id="257" r:id="rId3"/>
-    <p:sldId id="265" r:id="rId4"/>
-    <p:sldId id="266" r:id="rId5"/>
-    <p:sldId id="258" r:id="rId6"/>
-    <p:sldId id="264" r:id="rId7"/>
-    <p:sldId id="267" r:id="rId8"/>
-    <p:sldId id="259" r:id="rId9"/>
-    <p:sldId id="262" r:id="rId10"/>
-    <p:sldId id="263" r:id="rId11"/>
-    <p:sldId id="268" r:id="rId12"/>
+    <p:sldId id="270" r:id="rId4"/>
+    <p:sldId id="265" r:id="rId5"/>
+    <p:sldId id="267" r:id="rId6"/>
+    <p:sldId id="262" r:id="rId7"/>
+    <p:sldId id="269" r:id="rId8"/>
+    <p:sldId id="263" r:id="rId9"/>
+    <p:sldId id="268" r:id="rId10"/>
   </p:sldIdLst>
   <p:sldSz cx="12192000" cy="6858000"/>
   <p:notesSz cx="6858000" cy="9144000"/>
@@ -114,11 +112,16 @@
       </a:defRPr>
     </a:lvl9pPr>
   </p:defaultTextStyle>
+  <p:extLst>
+    <p:ext uri="{EFAFB233-063F-42B5-8137-9DF3F51BA10A}">
+      <p15:sldGuideLst xmlns:p15="http://schemas.microsoft.com/office/powerpoint/2012/main"/>
+    </p:ext>
+  </p:extLst>
 </p:presentation>
 </file>
 
 <file path=ppt/slideLayouts/slideLayout1.xml><?xml version="1.0" encoding="utf-8"?>
-<p:sldLayout xmlns:r="http://schemas.openxmlformats.org/officeDocument/2006/relationships" xmlns:c="http://schemas.openxmlformats.org/drawingml/2006/chart" xmlns:a="http://schemas.openxmlformats.org/drawingml/2006/main" xmlns:dgm="http://schemas.openxmlformats.org/drawingml/2006/diagram" xmlns:dsp="http://schemas.microsoft.com/office/drawing/2008/diagram" xmlns:p="http://schemas.openxmlformats.org/presentationml/2006/main" showMasterPhAnim="1" matchingName="제목 슬라이드" type="title" preserve="1">
+<p:sldLayout xmlns:a="http://schemas.openxmlformats.org/drawingml/2006/main" xmlns:r="http://schemas.openxmlformats.org/officeDocument/2006/relationships" xmlns:p="http://schemas.openxmlformats.org/presentationml/2006/main" matchingName="제목 슬라이드" type="title" preserve="1">
   <p:cSld name="제목 슬라이드">
     <p:spTree>
       <p:nvGrpSpPr>
@@ -141,7 +144,7 @@
             <a:spLocks noGrp="1"/>
           </p:cNvSpPr>
           <p:nvPr>
-            <p:ph type="ctrTitle" idx="0"/>
+            <p:ph type="ctrTitle"/>
           </p:nvPr>
         </p:nvSpPr>
         <p:spPr>
@@ -161,7 +164,6 @@
               <a:rPr lang="ko-KR" altLang="en-US"/>
               <a:t>마스터 제목 스타일 편집</a:t>
             </a:r>
-            <a:endParaRPr lang="ko-KR" altLang="en-US"/>
           </a:p>
         </p:txBody>
       </p:sp>
@@ -283,7 +285,6 @@
               <a:rPr lang="ko-KR" altLang="en-US"/>
               <a:t>마스터 부제목 스타일 편집</a:t>
             </a:r>
-            <a:endParaRPr lang="ko-KR" altLang="en-US"/>
           </a:p>
         </p:txBody>
       </p:sp>
@@ -310,7 +311,7 @@
               <a:pPr lvl="0">
                 <a:defRPr/>
               </a:pPr>
-              <a:t>2023-12-08</a:t>
+              <a:t>2023-12-27</a:t>
             </a:fld>
             <a:endParaRPr lang="ko-KR" altLang="en-US"/>
           </a:p>
@@ -334,10 +335,6 @@
             <a:pPr lvl="0">
               <a:defRPr/>
             </a:pPr>
-            <a:r>
-              <a:rPr lang="ko-KR" altLang="en-US"/>
-              <a:t/>
-            </a:r>
             <a:endParaRPr lang="ko-KR" altLang="en-US"/>
           </a:p>
         </p:txBody>
@@ -376,12 +373,12 @@
   <p:clrMapOvr>
     <a:masterClrMapping/>
   </p:clrMapOvr>
-  <p:transition xmlns:mc="http://schemas.openxmlformats.org/markup-compatibility/2006" xmlns:hp="http://schemas.haansoft.com/office/presentation/8.0" mc:Ignorable="hp" hp:hslDur="500"/>
+  <p:transition/>
 </p:sldLayout>
 </file>
 
 <file path=ppt/slideLayouts/slideLayout10.xml><?xml version="1.0" encoding="utf-8"?>
-<p:sldLayout xmlns:r="http://schemas.openxmlformats.org/officeDocument/2006/relationships" xmlns:c="http://schemas.openxmlformats.org/drawingml/2006/chart" xmlns:a="http://schemas.openxmlformats.org/drawingml/2006/main" xmlns:dgm="http://schemas.openxmlformats.org/drawingml/2006/diagram" xmlns:dsp="http://schemas.microsoft.com/office/drawing/2008/diagram" xmlns:p="http://schemas.openxmlformats.org/presentationml/2006/main" showMasterPhAnim="1" matchingName="간지" type="objOnly" preserve="1">
+<p:sldLayout xmlns:a="http://schemas.openxmlformats.org/drawingml/2006/main" xmlns:r="http://schemas.openxmlformats.org/officeDocument/2006/relationships" xmlns:p="http://schemas.openxmlformats.org/presentationml/2006/main" matchingName="간지" type="objOnly" preserve="1">
   <p:cSld name="간지">
     <p:spTree>
       <p:nvGrpSpPr>
@@ -404,7 +401,7 @@
             <a:spLocks noGrp="1"/>
           </p:cNvSpPr>
           <p:nvPr>
-            <p:ph type="ctrTitle" idx="0"/>
+            <p:ph type="ctrTitle"/>
           </p:nvPr>
         </p:nvSpPr>
         <p:spPr>
@@ -430,7 +427,6 @@
               <a:rPr lang="ko-KR" altLang="en-US"/>
               <a:t>마스터 제목 스타일 편집</a:t>
             </a:r>
-            <a:endParaRPr lang="ko-KR" altLang="en-US"/>
           </a:p>
         </p:txBody>
       </p:sp>
@@ -457,7 +453,7 @@
               <a:pPr lvl="0">
                 <a:defRPr/>
               </a:pPr>
-              <a:t>2023-12-08</a:t>
+              <a:t>2023-12-27</a:t>
             </a:fld>
             <a:endParaRPr lang="ko-KR" altLang="en-US"/>
           </a:p>
@@ -481,10 +477,6 @@
             <a:pPr lvl="0">
               <a:defRPr/>
             </a:pPr>
-            <a:r>
-              <a:rPr lang="ko-KR" altLang="en-US"/>
-              <a:t/>
-            </a:r>
             <a:endParaRPr lang="ko-KR" altLang="en-US"/>
           </a:p>
         </p:txBody>
@@ -523,12 +515,12 @@
   <p:clrMapOvr>
     <a:masterClrMapping/>
   </p:clrMapOvr>
-  <p:transition xmlns:mc="http://schemas.openxmlformats.org/markup-compatibility/2006" xmlns:hp="http://schemas.haansoft.com/office/presentation/8.0" mc:Ignorable="hp" hp:hslDur="500"/>
+  <p:transition/>
 </p:sldLayout>
 </file>
 
 <file path=ppt/slideLayouts/slideLayout11.xml><?xml version="1.0" encoding="utf-8"?>
-<p:sldLayout xmlns:r="http://schemas.openxmlformats.org/officeDocument/2006/relationships" xmlns:c="http://schemas.openxmlformats.org/drawingml/2006/chart" xmlns:a="http://schemas.openxmlformats.org/drawingml/2006/main" xmlns:dgm="http://schemas.openxmlformats.org/drawingml/2006/diagram" xmlns:dsp="http://schemas.microsoft.com/office/drawing/2008/diagram" xmlns:p="http://schemas.openxmlformats.org/presentationml/2006/main" showMasterPhAnim="1" matchingName="목차" type="clipArtAndTx" preserve="1">
+<p:sldLayout xmlns:a="http://schemas.openxmlformats.org/drawingml/2006/main" xmlns:r="http://schemas.openxmlformats.org/officeDocument/2006/relationships" xmlns:p="http://schemas.openxmlformats.org/presentationml/2006/main" matchingName="목차" type="clipArtAndTx" preserve="1">
   <p:cSld name="목차">
     <p:spTree>
       <p:nvGrpSpPr>
@@ -551,7 +543,7 @@
             <a:spLocks noGrp="1"/>
           </p:cNvSpPr>
           <p:nvPr>
-            <p:ph type="title" idx="0"/>
+            <p:ph type="title"/>
           </p:nvPr>
         </p:nvSpPr>
         <p:spPr>
@@ -575,7 +567,6 @@
               <a:rPr lang="ko-KR" altLang="en-US"/>
               <a:t>마스터 제목 스타일 편집</a:t>
             </a:r>
-            <a:endParaRPr lang="ko-KR" altLang="en-US"/>
           </a:p>
         </p:txBody>
       </p:sp>
@@ -615,7 +606,6 @@
               <a:rPr lang="ko-KR" altLang="en-US"/>
               <a:t>첫째 목차</a:t>
             </a:r>
-            <a:endParaRPr lang="ko-KR" altLang="en-US"/>
           </a:p>
           <a:p>
             <a:pPr lvl="0">
@@ -625,7 +615,6 @@
               <a:rPr lang="ko-KR" altLang="en-US"/>
               <a:t>둘째 목차</a:t>
             </a:r>
-            <a:endParaRPr lang="ko-KR" altLang="en-US"/>
           </a:p>
           <a:p>
             <a:pPr lvl="0">
@@ -635,7 +624,6 @@
               <a:rPr lang="ko-KR" altLang="en-US"/>
               <a:t>셋째 목차</a:t>
             </a:r>
-            <a:endParaRPr lang="ko-KR" altLang="en-US"/>
           </a:p>
           <a:p>
             <a:pPr lvl="0">
@@ -645,7 +633,6 @@
               <a:rPr lang="ko-KR" altLang="en-US"/>
               <a:t>넷째 목차</a:t>
             </a:r>
-            <a:endParaRPr lang="ko-KR" altLang="en-US"/>
           </a:p>
           <a:p>
             <a:pPr lvl="0">
@@ -655,7 +642,6 @@
               <a:rPr lang="ko-KR" altLang="en-US"/>
               <a:t>다섯째 목차</a:t>
             </a:r>
-            <a:endParaRPr lang="ko-KR" altLang="en-US"/>
           </a:p>
         </p:txBody>
       </p:sp>
@@ -682,7 +668,7 @@
               <a:pPr lvl="0">
                 <a:defRPr/>
               </a:pPr>
-              <a:t>2023-12-08</a:t>
+              <a:t>2023-12-27</a:t>
             </a:fld>
             <a:endParaRPr lang="ko-KR" altLang="en-US"/>
           </a:p>
@@ -706,10 +692,6 @@
             <a:pPr lvl="0">
               <a:defRPr/>
             </a:pPr>
-            <a:r>
-              <a:rPr lang="ko-KR" altLang="en-US"/>
-              <a:t/>
-            </a:r>
             <a:endParaRPr lang="ko-KR" altLang="en-US"/>
           </a:p>
         </p:txBody>
@@ -748,12 +730,12 @@
   <p:clrMapOvr>
     <a:masterClrMapping/>
   </p:clrMapOvr>
-  <p:transition xmlns:mc="http://schemas.openxmlformats.org/markup-compatibility/2006" xmlns:hp="http://schemas.haansoft.com/office/presentation/8.0" mc:Ignorable="hp" hp:hslDur="500"/>
+  <p:transition/>
 </p:sldLayout>
 </file>
 
 <file path=ppt/slideLayouts/slideLayout12.xml><?xml version="1.0" encoding="utf-8"?>
-<p:sldLayout xmlns:r="http://schemas.openxmlformats.org/officeDocument/2006/relationships" xmlns:c="http://schemas.openxmlformats.org/drawingml/2006/chart" xmlns:a="http://schemas.openxmlformats.org/drawingml/2006/main" xmlns:dgm="http://schemas.openxmlformats.org/drawingml/2006/diagram" xmlns:dsp="http://schemas.microsoft.com/office/drawing/2008/diagram" xmlns:p="http://schemas.openxmlformats.org/presentationml/2006/main" showMasterPhAnim="1" matchingName="세로 제목 및 본문" type="vertTitleAndTx" preserve="1">
+<p:sldLayout xmlns:a="http://schemas.openxmlformats.org/drawingml/2006/main" xmlns:r="http://schemas.openxmlformats.org/officeDocument/2006/relationships" xmlns:p="http://schemas.openxmlformats.org/presentationml/2006/main" matchingName="세로 제목 및 본문" type="vertTitleAndTx" preserve="1">
   <p:cSld name="세로 제목 및 본문">
     <p:spTree>
       <p:nvGrpSpPr>
@@ -776,7 +758,7 @@
             <a:spLocks noGrp="1"/>
           </p:cNvSpPr>
           <p:nvPr>
-            <p:ph type="title" orient="vert" idx="0"/>
+            <p:ph type="title" orient="vert"/>
           </p:nvPr>
         </p:nvSpPr>
         <p:spPr>
@@ -796,7 +778,6 @@
               <a:rPr lang="ko-KR" altLang="en-US"/>
               <a:t>마스터 제목 스타일 편집</a:t>
             </a:r>
-            <a:endParaRPr lang="ko-KR" altLang="en-US"/>
           </a:p>
         </p:txBody>
       </p:sp>
@@ -827,7 +808,6 @@
               <a:rPr lang="ko-KR" altLang="en-US"/>
               <a:t>마스터 텍스트 스타일을 편집합니다</a:t>
             </a:r>
-            <a:endParaRPr lang="ko-KR" altLang="en-US"/>
           </a:p>
           <a:p>
             <a:pPr lvl="1">
@@ -837,7 +817,6 @@
               <a:rPr lang="ko-KR" altLang="en-US"/>
               <a:t>둘째 수준</a:t>
             </a:r>
-            <a:endParaRPr lang="ko-KR" altLang="en-US"/>
           </a:p>
           <a:p>
             <a:pPr lvl="2">
@@ -847,7 +826,6 @@
               <a:rPr lang="ko-KR" altLang="en-US"/>
               <a:t>셋째 수준</a:t>
             </a:r>
-            <a:endParaRPr lang="ko-KR" altLang="en-US"/>
           </a:p>
           <a:p>
             <a:pPr lvl="3">
@@ -857,7 +835,6 @@
               <a:rPr lang="ko-KR" altLang="en-US"/>
               <a:t>넷째 수준</a:t>
             </a:r>
-            <a:endParaRPr lang="ko-KR" altLang="en-US"/>
           </a:p>
           <a:p>
             <a:pPr lvl="4">
@@ -867,7 +844,6 @@
               <a:rPr lang="ko-KR" altLang="en-US"/>
               <a:t>다섯째 수준</a:t>
             </a:r>
-            <a:endParaRPr lang="ko-KR" altLang="en-US"/>
           </a:p>
         </p:txBody>
       </p:sp>
@@ -894,7 +870,7 @@
               <a:pPr lvl="0">
                 <a:defRPr/>
               </a:pPr>
-              <a:t>2023-12-08</a:t>
+              <a:t>2023-12-27</a:t>
             </a:fld>
             <a:endParaRPr lang="ko-KR" altLang="en-US"/>
           </a:p>
@@ -918,10 +894,6 @@
             <a:pPr lvl="0">
               <a:defRPr/>
             </a:pPr>
-            <a:r>
-              <a:rPr lang="ko-KR" altLang="en-US"/>
-              <a:t/>
-            </a:r>
             <a:endParaRPr lang="ko-KR" altLang="en-US"/>
           </a:p>
         </p:txBody>
@@ -960,12 +932,12 @@
   <p:clrMapOvr>
     <a:masterClrMapping/>
   </p:clrMapOvr>
-  <p:transition xmlns:mc="http://schemas.openxmlformats.org/markup-compatibility/2006" xmlns:hp="http://schemas.haansoft.com/office/presentation/8.0" mc:Ignorable="hp" hp:hslDur="500"/>
+  <p:transition/>
 </p:sldLayout>
 </file>
 
 <file path=ppt/slideLayouts/slideLayout2.xml><?xml version="1.0" encoding="utf-8"?>
-<p:sldLayout xmlns:r="http://schemas.openxmlformats.org/officeDocument/2006/relationships" xmlns:c="http://schemas.openxmlformats.org/drawingml/2006/chart" xmlns:a="http://schemas.openxmlformats.org/drawingml/2006/main" xmlns:dgm="http://schemas.openxmlformats.org/drawingml/2006/diagram" xmlns:dsp="http://schemas.microsoft.com/office/drawing/2008/diagram" xmlns:p="http://schemas.openxmlformats.org/presentationml/2006/main" showMasterPhAnim="1" matchingName="제목 및 내용" type="obj" preserve="1">
+<p:sldLayout xmlns:a="http://schemas.openxmlformats.org/drawingml/2006/main" xmlns:r="http://schemas.openxmlformats.org/officeDocument/2006/relationships" xmlns:p="http://schemas.openxmlformats.org/presentationml/2006/main" matchingName="제목 및 내용" type="obj" preserve="1">
   <p:cSld name="제목 및 내용">
     <p:spTree>
       <p:nvGrpSpPr>
@@ -988,7 +960,7 @@
             <a:spLocks noGrp="1"/>
           </p:cNvSpPr>
           <p:nvPr>
-            <p:ph type="title" idx="0"/>
+            <p:ph type="title"/>
           </p:nvPr>
         </p:nvSpPr>
         <p:spPr/>
@@ -1003,7 +975,6 @@
               <a:rPr lang="ko-KR" altLang="en-US"/>
               <a:t>마스터 제목 스타일 편집</a:t>
             </a:r>
-            <a:endParaRPr lang="ko-KR" altLang="en-US"/>
           </a:p>
         </p:txBody>
       </p:sp>
@@ -1029,7 +1000,6 @@
               <a:rPr lang="ko-KR" altLang="en-US"/>
               <a:t>마스터 텍스트 스타일을 편집합니다</a:t>
             </a:r>
-            <a:endParaRPr lang="ko-KR" altLang="en-US"/>
           </a:p>
           <a:p>
             <a:pPr lvl="1">
@@ -1039,7 +1009,6 @@
               <a:rPr lang="ko-KR" altLang="en-US"/>
               <a:t>둘째 수준</a:t>
             </a:r>
-            <a:endParaRPr lang="ko-KR" altLang="en-US"/>
           </a:p>
           <a:p>
             <a:pPr lvl="2">
@@ -1049,7 +1018,6 @@
               <a:rPr lang="ko-KR" altLang="en-US"/>
               <a:t>셋째 수준</a:t>
             </a:r>
-            <a:endParaRPr lang="ko-KR" altLang="en-US"/>
           </a:p>
           <a:p>
             <a:pPr lvl="3">
@@ -1059,7 +1027,6 @@
               <a:rPr lang="ko-KR" altLang="en-US"/>
               <a:t>넷째 수준</a:t>
             </a:r>
-            <a:endParaRPr lang="ko-KR" altLang="en-US"/>
           </a:p>
           <a:p>
             <a:pPr lvl="4">
@@ -1069,7 +1036,6 @@
               <a:rPr lang="ko-KR" altLang="en-US"/>
               <a:t>다섯째 수준</a:t>
             </a:r>
-            <a:endParaRPr lang="ko-KR" altLang="en-US"/>
           </a:p>
         </p:txBody>
       </p:sp>
@@ -1096,7 +1062,7 @@
               <a:pPr lvl="0">
                 <a:defRPr/>
               </a:pPr>
-              <a:t>2023-12-08</a:t>
+              <a:t>2023-12-27</a:t>
             </a:fld>
             <a:endParaRPr lang="ko-KR" altLang="en-US"/>
           </a:p>
@@ -1120,10 +1086,6 @@
             <a:pPr lvl="0">
               <a:defRPr/>
             </a:pPr>
-            <a:r>
-              <a:rPr lang="ko-KR" altLang="en-US"/>
-              <a:t/>
-            </a:r>
             <a:endParaRPr lang="ko-KR" altLang="en-US"/>
           </a:p>
         </p:txBody>
@@ -1162,12 +1124,12 @@
   <p:clrMapOvr>
     <a:masterClrMapping/>
   </p:clrMapOvr>
-  <p:transition xmlns:mc="http://schemas.openxmlformats.org/markup-compatibility/2006" xmlns:hp="http://schemas.haansoft.com/office/presentation/8.0" mc:Ignorable="hp" hp:hslDur="500"/>
+  <p:transition/>
 </p:sldLayout>
 </file>
 
 <file path=ppt/slideLayouts/slideLayout3.xml><?xml version="1.0" encoding="utf-8"?>
-<p:sldLayout xmlns:r="http://schemas.openxmlformats.org/officeDocument/2006/relationships" xmlns:c="http://schemas.openxmlformats.org/drawingml/2006/chart" xmlns:a="http://schemas.openxmlformats.org/drawingml/2006/main" xmlns:dgm="http://schemas.openxmlformats.org/drawingml/2006/diagram" xmlns:dsp="http://schemas.microsoft.com/office/drawing/2008/diagram" xmlns:p="http://schemas.openxmlformats.org/presentationml/2006/main" showMasterPhAnim="1" matchingName="빈 화면" type="blank" preserve="1">
+<p:sldLayout xmlns:a="http://schemas.openxmlformats.org/drawingml/2006/main" xmlns:r="http://schemas.openxmlformats.org/officeDocument/2006/relationships" xmlns:p="http://schemas.openxmlformats.org/presentationml/2006/main" matchingName="빈 화면" type="blank" preserve="1">
   <p:cSld name="빈 화면">
     <p:spTree>
       <p:nvGrpSpPr>
@@ -1206,7 +1168,7 @@
               <a:pPr lvl="0">
                 <a:defRPr/>
               </a:pPr>
-              <a:t>2023-12-08</a:t>
+              <a:t>2023-12-27</a:t>
             </a:fld>
             <a:endParaRPr lang="ko-KR" altLang="en-US"/>
           </a:p>
@@ -1230,10 +1192,6 @@
             <a:pPr lvl="0">
               <a:defRPr/>
             </a:pPr>
-            <a:r>
-              <a:rPr lang="ko-KR" altLang="en-US"/>
-              <a:t/>
-            </a:r>
             <a:endParaRPr lang="ko-KR" altLang="en-US"/>
           </a:p>
         </p:txBody>
@@ -1272,12 +1230,12 @@
   <p:clrMapOvr>
     <a:masterClrMapping/>
   </p:clrMapOvr>
-  <p:transition xmlns:mc="http://schemas.openxmlformats.org/markup-compatibility/2006" xmlns:hp="http://schemas.haansoft.com/office/presentation/8.0" mc:Ignorable="hp" hp:hslDur="500"/>
+  <p:transition/>
 </p:sldLayout>
 </file>
 
 <file path=ppt/slideLayouts/slideLayout4.xml><?xml version="1.0" encoding="utf-8"?>
-<p:sldLayout xmlns:r="http://schemas.openxmlformats.org/officeDocument/2006/relationships" xmlns:c="http://schemas.openxmlformats.org/drawingml/2006/chart" xmlns:a="http://schemas.openxmlformats.org/drawingml/2006/main" xmlns:dgm="http://schemas.openxmlformats.org/drawingml/2006/diagram" xmlns:dsp="http://schemas.microsoft.com/office/drawing/2008/diagram" xmlns:p="http://schemas.openxmlformats.org/presentationml/2006/main" showMasterPhAnim="1" matchingName="구역 머리글" type="secHead" preserve="1">
+<p:sldLayout xmlns:a="http://schemas.openxmlformats.org/drawingml/2006/main" xmlns:r="http://schemas.openxmlformats.org/officeDocument/2006/relationships" xmlns:p="http://schemas.openxmlformats.org/presentationml/2006/main" matchingName="구역 머리글" type="secHead" preserve="1">
   <p:cSld name="구역 머리글">
     <p:spTree>
       <p:nvGrpSpPr>
@@ -1300,7 +1258,7 @@
             <a:spLocks noGrp="1"/>
           </p:cNvSpPr>
           <p:nvPr>
-            <p:ph type="title" idx="0"/>
+            <p:ph type="title"/>
           </p:nvPr>
         </p:nvSpPr>
         <p:spPr>
@@ -1324,7 +1282,6 @@
               <a:rPr lang="ko-KR" altLang="en-US"/>
               <a:t>마스터 제목 스타일 편집</a:t>
             </a:r>
-            <a:endParaRPr lang="ko-KR" altLang="en-US"/>
           </a:p>
         </p:txBody>
       </p:sp>
@@ -1446,7 +1403,6 @@
               <a:rPr lang="ko-KR" altLang="en-US"/>
               <a:t>마스터 텍스트 스타일을 편집합니다</a:t>
             </a:r>
-            <a:endParaRPr lang="ko-KR" altLang="en-US"/>
           </a:p>
         </p:txBody>
       </p:sp>
@@ -1473,7 +1429,7 @@
               <a:pPr lvl="0">
                 <a:defRPr/>
               </a:pPr>
-              <a:t>2023-12-08</a:t>
+              <a:t>2023-12-27</a:t>
             </a:fld>
             <a:endParaRPr lang="ko-KR" altLang="en-US"/>
           </a:p>
@@ -1497,10 +1453,6 @@
             <a:pPr lvl="0">
               <a:defRPr/>
             </a:pPr>
-            <a:r>
-              <a:rPr lang="ko-KR" altLang="en-US"/>
-              <a:t/>
-            </a:r>
             <a:endParaRPr lang="ko-KR" altLang="en-US"/>
           </a:p>
         </p:txBody>
@@ -1539,12 +1491,12 @@
   <p:clrMapOvr>
     <a:masterClrMapping/>
   </p:clrMapOvr>
-  <p:transition xmlns:mc="http://schemas.openxmlformats.org/markup-compatibility/2006" xmlns:hp="http://schemas.haansoft.com/office/presentation/8.0" mc:Ignorable="hp" hp:hslDur="500"/>
+  <p:transition/>
 </p:sldLayout>
 </file>
 
 <file path=ppt/slideLayouts/slideLayout5.xml><?xml version="1.0" encoding="utf-8"?>
-<p:sldLayout xmlns:r="http://schemas.openxmlformats.org/officeDocument/2006/relationships" xmlns:c="http://schemas.openxmlformats.org/drawingml/2006/chart" xmlns:a="http://schemas.openxmlformats.org/drawingml/2006/main" xmlns:dgm="http://schemas.openxmlformats.org/drawingml/2006/diagram" xmlns:dsp="http://schemas.microsoft.com/office/drawing/2008/diagram" xmlns:p="http://schemas.openxmlformats.org/presentationml/2006/main" showMasterPhAnim="1" matchingName="내용 2개" type="twoObj" preserve="1">
+<p:sldLayout xmlns:a="http://schemas.openxmlformats.org/drawingml/2006/main" xmlns:r="http://schemas.openxmlformats.org/officeDocument/2006/relationships" xmlns:p="http://schemas.openxmlformats.org/presentationml/2006/main" matchingName="내용 2개" type="twoObj" preserve="1">
   <p:cSld name="내용 2개">
     <p:spTree>
       <p:nvGrpSpPr>
@@ -1567,7 +1519,7 @@
             <a:spLocks noGrp="1"/>
           </p:cNvSpPr>
           <p:nvPr>
-            <p:ph type="title" idx="0"/>
+            <p:ph type="title"/>
           </p:nvPr>
         </p:nvSpPr>
         <p:spPr/>
@@ -1582,7 +1534,6 @@
               <a:rPr lang="ko-KR" altLang="en-US"/>
               <a:t>마스터 제목 스타일 편집</a:t>
             </a:r>
-            <a:endParaRPr lang="ko-KR" altLang="en-US"/>
           </a:p>
         </p:txBody>
       </p:sp>
@@ -1641,7 +1592,6 @@
               <a:rPr lang="ko-KR" altLang="en-US"/>
               <a:t>마스터 텍스트 스타일을 편집합니다</a:t>
             </a:r>
-            <a:endParaRPr lang="ko-KR" altLang="en-US"/>
           </a:p>
           <a:p>
             <a:pPr lvl="1">
@@ -1651,7 +1601,6 @@
               <a:rPr lang="ko-KR" altLang="en-US"/>
               <a:t>둘째 수준</a:t>
             </a:r>
-            <a:endParaRPr lang="ko-KR" altLang="en-US"/>
           </a:p>
           <a:p>
             <a:pPr lvl="2">
@@ -1661,7 +1610,6 @@
               <a:rPr lang="ko-KR" altLang="en-US"/>
               <a:t>셋째 수준</a:t>
             </a:r>
-            <a:endParaRPr lang="ko-KR" altLang="en-US"/>
           </a:p>
           <a:p>
             <a:pPr lvl="3">
@@ -1671,7 +1619,6 @@
               <a:rPr lang="ko-KR" altLang="en-US"/>
               <a:t>넷째 수준</a:t>
             </a:r>
-            <a:endParaRPr lang="ko-KR" altLang="en-US"/>
           </a:p>
           <a:p>
             <a:pPr lvl="4">
@@ -1681,7 +1628,6 @@
               <a:rPr lang="ko-KR" altLang="en-US"/>
               <a:t>다섯째 수준</a:t>
             </a:r>
-            <a:endParaRPr lang="ko-KR" altLang="en-US"/>
           </a:p>
         </p:txBody>
       </p:sp>
@@ -1740,7 +1686,6 @@
               <a:rPr lang="ko-KR" altLang="en-US"/>
               <a:t>마스터 텍스트 스타일을 편집합니다</a:t>
             </a:r>
-            <a:endParaRPr lang="ko-KR" altLang="en-US"/>
           </a:p>
           <a:p>
             <a:pPr lvl="1">
@@ -1750,7 +1695,6 @@
               <a:rPr lang="ko-KR" altLang="en-US"/>
               <a:t>둘째 수준</a:t>
             </a:r>
-            <a:endParaRPr lang="ko-KR" altLang="en-US"/>
           </a:p>
           <a:p>
             <a:pPr lvl="2">
@@ -1760,7 +1704,6 @@
               <a:rPr lang="ko-KR" altLang="en-US"/>
               <a:t>셋째 수준</a:t>
             </a:r>
-            <a:endParaRPr lang="ko-KR" altLang="en-US"/>
           </a:p>
           <a:p>
             <a:pPr lvl="3">
@@ -1770,7 +1713,6 @@
               <a:rPr lang="ko-KR" altLang="en-US"/>
               <a:t>넷째 수준</a:t>
             </a:r>
-            <a:endParaRPr lang="ko-KR" altLang="en-US"/>
           </a:p>
           <a:p>
             <a:pPr lvl="4">
@@ -1780,7 +1722,6 @@
               <a:rPr lang="ko-KR" altLang="en-US"/>
               <a:t>다섯째 수준</a:t>
             </a:r>
-            <a:endParaRPr lang="ko-KR" altLang="en-US"/>
           </a:p>
         </p:txBody>
       </p:sp>
@@ -1807,7 +1748,7 @@
               <a:pPr lvl="0">
                 <a:defRPr/>
               </a:pPr>
-              <a:t>2023-12-08</a:t>
+              <a:t>2023-12-27</a:t>
             </a:fld>
             <a:endParaRPr lang="ko-KR" altLang="en-US"/>
           </a:p>
@@ -1831,10 +1772,6 @@
             <a:pPr lvl="0">
               <a:defRPr/>
             </a:pPr>
-            <a:r>
-              <a:rPr lang="ko-KR" altLang="en-US"/>
-              <a:t/>
-            </a:r>
             <a:endParaRPr lang="ko-KR" altLang="en-US"/>
           </a:p>
         </p:txBody>
@@ -1873,12 +1810,12 @@
   <p:clrMapOvr>
     <a:masterClrMapping/>
   </p:clrMapOvr>
-  <p:transition xmlns:mc="http://schemas.openxmlformats.org/markup-compatibility/2006" xmlns:hp="http://schemas.haansoft.com/office/presentation/8.0" mc:Ignorable="hp" hp:hslDur="500"/>
+  <p:transition/>
 </p:sldLayout>
 </file>
 
 <file path=ppt/slideLayouts/slideLayout6.xml><?xml version="1.0" encoding="utf-8"?>
-<p:sldLayout xmlns:r="http://schemas.openxmlformats.org/officeDocument/2006/relationships" xmlns:c="http://schemas.openxmlformats.org/drawingml/2006/chart" xmlns:a="http://schemas.openxmlformats.org/drawingml/2006/main" xmlns:dgm="http://schemas.openxmlformats.org/drawingml/2006/diagram" xmlns:dsp="http://schemas.microsoft.com/office/drawing/2008/diagram" xmlns:p="http://schemas.openxmlformats.org/presentationml/2006/main" showMasterPhAnim="1" matchingName="제목만" type="titleOnly" preserve="1">
+<p:sldLayout xmlns:a="http://schemas.openxmlformats.org/drawingml/2006/main" xmlns:r="http://schemas.openxmlformats.org/officeDocument/2006/relationships" xmlns:p="http://schemas.openxmlformats.org/presentationml/2006/main" matchingName="제목만" type="titleOnly" preserve="1">
   <p:cSld name="제목만">
     <p:spTree>
       <p:nvGrpSpPr>
@@ -1901,7 +1838,7 @@
             <a:spLocks noGrp="1"/>
           </p:cNvSpPr>
           <p:nvPr>
-            <p:ph type="title" idx="0"/>
+            <p:ph type="title"/>
           </p:nvPr>
         </p:nvSpPr>
         <p:spPr/>
@@ -1916,7 +1853,6 @@
               <a:rPr lang="ko-KR" altLang="en-US"/>
               <a:t>마스터 제목 스타일 편집</a:t>
             </a:r>
-            <a:endParaRPr lang="ko-KR" altLang="en-US"/>
           </a:p>
         </p:txBody>
       </p:sp>
@@ -1943,7 +1879,7 @@
               <a:pPr lvl="0">
                 <a:defRPr/>
               </a:pPr>
-              <a:t>2023-12-08</a:t>
+              <a:t>2023-12-27</a:t>
             </a:fld>
             <a:endParaRPr lang="ko-KR" altLang="en-US"/>
           </a:p>
@@ -1967,10 +1903,6 @@
             <a:pPr lvl="0">
               <a:defRPr/>
             </a:pPr>
-            <a:r>
-              <a:rPr lang="ko-KR" altLang="en-US"/>
-              <a:t/>
-            </a:r>
             <a:endParaRPr lang="ko-KR" altLang="en-US"/>
           </a:p>
         </p:txBody>
@@ -2009,12 +1941,12 @@
   <p:clrMapOvr>
     <a:masterClrMapping/>
   </p:clrMapOvr>
-  <p:transition xmlns:mc="http://schemas.openxmlformats.org/markup-compatibility/2006" xmlns:hp="http://schemas.haansoft.com/office/presentation/8.0" mc:Ignorable="hp" hp:hslDur="500"/>
+  <p:transition/>
 </p:sldLayout>
 </file>
 
 <file path=ppt/slideLayouts/slideLayout7.xml><?xml version="1.0" encoding="utf-8"?>
-<p:sldLayout xmlns:r="http://schemas.openxmlformats.org/officeDocument/2006/relationships" xmlns:c="http://schemas.openxmlformats.org/drawingml/2006/chart" xmlns:a="http://schemas.openxmlformats.org/drawingml/2006/main" xmlns:dgm="http://schemas.openxmlformats.org/drawingml/2006/diagram" xmlns:dsp="http://schemas.microsoft.com/office/drawing/2008/diagram" xmlns:p="http://schemas.openxmlformats.org/presentationml/2006/main" showMasterPhAnim="1" matchingName="표" type="tbl" preserve="1">
+<p:sldLayout xmlns:a="http://schemas.openxmlformats.org/drawingml/2006/main" xmlns:r="http://schemas.openxmlformats.org/officeDocument/2006/relationships" xmlns:p="http://schemas.openxmlformats.org/presentationml/2006/main" matchingName="표" type="tbl" preserve="1">
   <p:cSld name="표">
     <p:spTree>
       <p:nvGrpSpPr>
@@ -2037,7 +1969,7 @@
             <a:spLocks noGrp="1"/>
           </p:cNvSpPr>
           <p:nvPr>
-            <p:ph type="title" idx="0"/>
+            <p:ph type="title"/>
           </p:nvPr>
         </p:nvSpPr>
         <p:spPr/>
@@ -2052,7 +1984,6 @@
               <a:rPr lang="ko-KR" altLang="en-US"/>
               <a:t>마스터 제목 스타일 편집</a:t>
             </a:r>
-            <a:endParaRPr lang="ko-KR" altLang="en-US"/>
           </a:p>
         </p:txBody>
       </p:sp>
@@ -2089,7 +2020,6 @@
               <a:rPr lang="ko-KR" altLang="en-US"/>
               <a:t>표</a:t>
             </a:r>
-            <a:endParaRPr lang="ko-KR" altLang="en-US"/>
           </a:p>
         </p:txBody>
       </p:sp>
@@ -2116,7 +2046,7 @@
               <a:pPr lvl="0">
                 <a:defRPr/>
               </a:pPr>
-              <a:t>2023-12-08</a:t>
+              <a:t>2023-12-27</a:t>
             </a:fld>
             <a:endParaRPr lang="ko-KR" altLang="en-US"/>
           </a:p>
@@ -2140,10 +2070,6 @@
             <a:pPr lvl="0">
               <a:defRPr/>
             </a:pPr>
-            <a:r>
-              <a:rPr lang="ko-KR" altLang="en-US"/>
-              <a:t/>
-            </a:r>
             <a:endParaRPr lang="ko-KR" altLang="en-US"/>
           </a:p>
         </p:txBody>
@@ -2182,12 +2108,12 @@
   <p:clrMapOvr>
     <a:masterClrMapping/>
   </p:clrMapOvr>
-  <p:transition xmlns:mc="http://schemas.openxmlformats.org/markup-compatibility/2006" xmlns:hp="http://schemas.haansoft.com/office/presentation/8.0" mc:Ignorable="hp" hp:hslDur="500"/>
+  <p:transition/>
 </p:sldLayout>
 </file>
 
 <file path=ppt/slideLayouts/slideLayout8.xml><?xml version="1.0" encoding="utf-8"?>
-<p:sldLayout xmlns:r="http://schemas.openxmlformats.org/officeDocument/2006/relationships" xmlns:c="http://schemas.openxmlformats.org/drawingml/2006/chart" xmlns:a="http://schemas.openxmlformats.org/drawingml/2006/main" xmlns:dgm="http://schemas.openxmlformats.org/drawingml/2006/diagram" xmlns:dsp="http://schemas.microsoft.com/office/drawing/2008/diagram" xmlns:p="http://schemas.openxmlformats.org/presentationml/2006/main" showMasterPhAnim="1" matchingName="내용 4개" type="fourObj" preserve="1">
+<p:sldLayout xmlns:a="http://schemas.openxmlformats.org/drawingml/2006/main" xmlns:r="http://schemas.openxmlformats.org/officeDocument/2006/relationships" xmlns:p="http://schemas.openxmlformats.org/presentationml/2006/main" matchingName="내용 4개" type="fourObj" preserve="1">
   <p:cSld name="내용 4개">
     <p:spTree>
       <p:nvGrpSpPr>
@@ -2210,7 +2136,7 @@
             <a:spLocks noGrp="1"/>
           </p:cNvSpPr>
           <p:nvPr>
-            <p:ph type="title" idx="0"/>
+            <p:ph type="title"/>
           </p:nvPr>
         </p:nvSpPr>
         <p:spPr/>
@@ -2225,7 +2151,6 @@
               <a:rPr lang="ko-KR" altLang="en-US"/>
               <a:t>마스터 제목 스타일 편집</a:t>
             </a:r>
-            <a:endParaRPr lang="ko-KR" altLang="en-US"/>
           </a:p>
         </p:txBody>
       </p:sp>
@@ -2284,7 +2209,6 @@
               <a:rPr lang="ko-KR" altLang="en-US"/>
               <a:t>마스터 텍스트 스타일을 편집합니다</a:t>
             </a:r>
-            <a:endParaRPr lang="ko-KR" altLang="en-US"/>
           </a:p>
           <a:p>
             <a:pPr lvl="1">
@@ -2294,7 +2218,6 @@
               <a:rPr lang="ko-KR" altLang="en-US"/>
               <a:t>둘째 수준</a:t>
             </a:r>
-            <a:endParaRPr lang="ko-KR" altLang="en-US"/>
           </a:p>
           <a:p>
             <a:pPr lvl="2">
@@ -2304,7 +2227,6 @@
               <a:rPr lang="ko-KR" altLang="en-US"/>
               <a:t>셋째 수준</a:t>
             </a:r>
-            <a:endParaRPr lang="ko-KR" altLang="en-US"/>
           </a:p>
           <a:p>
             <a:pPr lvl="3">
@@ -2314,7 +2236,6 @@
               <a:rPr lang="ko-KR" altLang="en-US"/>
               <a:t>넷째 수준</a:t>
             </a:r>
-            <a:endParaRPr lang="ko-KR" altLang="en-US"/>
           </a:p>
           <a:p>
             <a:pPr lvl="4">
@@ -2324,7 +2245,6 @@
               <a:rPr lang="ko-KR" altLang="en-US"/>
               <a:t>다섯째 수준</a:t>
             </a:r>
-            <a:endParaRPr lang="ko-KR" altLang="en-US"/>
           </a:p>
         </p:txBody>
       </p:sp>
@@ -2383,7 +2303,6 @@
               <a:rPr lang="ko-KR" altLang="en-US"/>
               <a:t>마스터 텍스트 스타일을 편집합니다</a:t>
             </a:r>
-            <a:endParaRPr lang="ko-KR" altLang="en-US"/>
           </a:p>
           <a:p>
             <a:pPr lvl="1">
@@ -2393,7 +2312,6 @@
               <a:rPr lang="ko-KR" altLang="en-US"/>
               <a:t>둘째 수준</a:t>
             </a:r>
-            <a:endParaRPr lang="ko-KR" altLang="en-US"/>
           </a:p>
           <a:p>
             <a:pPr lvl="2">
@@ -2403,7 +2321,6 @@
               <a:rPr lang="ko-KR" altLang="en-US"/>
               <a:t>셋째 수준</a:t>
             </a:r>
-            <a:endParaRPr lang="ko-KR" altLang="en-US"/>
           </a:p>
           <a:p>
             <a:pPr lvl="3">
@@ -2413,7 +2330,6 @@
               <a:rPr lang="ko-KR" altLang="en-US"/>
               <a:t>넷째 수준</a:t>
             </a:r>
-            <a:endParaRPr lang="ko-KR" altLang="en-US"/>
           </a:p>
           <a:p>
             <a:pPr lvl="4">
@@ -2423,7 +2339,6 @@
               <a:rPr lang="ko-KR" altLang="en-US"/>
               <a:t>다섯째 수준</a:t>
             </a:r>
-            <a:endParaRPr lang="ko-KR" altLang="en-US"/>
           </a:p>
         </p:txBody>
       </p:sp>
@@ -2482,7 +2397,6 @@
               <a:rPr lang="ko-KR" altLang="en-US"/>
               <a:t>마스터 텍스트 스타일을 편집합니다</a:t>
             </a:r>
-            <a:endParaRPr lang="ko-KR" altLang="en-US"/>
           </a:p>
           <a:p>
             <a:pPr lvl="1">
@@ -2492,7 +2406,6 @@
               <a:rPr lang="ko-KR" altLang="en-US"/>
               <a:t>둘째 수준</a:t>
             </a:r>
-            <a:endParaRPr lang="ko-KR" altLang="en-US"/>
           </a:p>
           <a:p>
             <a:pPr lvl="2">
@@ -2502,7 +2415,6 @@
               <a:rPr lang="ko-KR" altLang="en-US"/>
               <a:t>셋째 수준</a:t>
             </a:r>
-            <a:endParaRPr lang="ko-KR" altLang="en-US"/>
           </a:p>
           <a:p>
             <a:pPr lvl="3">
@@ -2512,7 +2424,6 @@
               <a:rPr lang="ko-KR" altLang="en-US"/>
               <a:t>넷째 수준</a:t>
             </a:r>
-            <a:endParaRPr lang="ko-KR" altLang="en-US"/>
           </a:p>
           <a:p>
             <a:pPr lvl="4">
@@ -2522,7 +2433,6 @@
               <a:rPr lang="ko-KR" altLang="en-US"/>
               <a:t>다섯째 수준</a:t>
             </a:r>
-            <a:endParaRPr lang="ko-KR" altLang="en-US"/>
           </a:p>
         </p:txBody>
       </p:sp>
@@ -2581,7 +2491,6 @@
               <a:rPr lang="ko-KR" altLang="en-US"/>
               <a:t>마스터 텍스트 스타일을 편집합니다</a:t>
             </a:r>
-            <a:endParaRPr lang="ko-KR" altLang="en-US"/>
           </a:p>
           <a:p>
             <a:pPr lvl="1">
@@ -2591,7 +2500,6 @@
               <a:rPr lang="ko-KR" altLang="en-US"/>
               <a:t>둘째 수준</a:t>
             </a:r>
-            <a:endParaRPr lang="ko-KR" altLang="en-US"/>
           </a:p>
           <a:p>
             <a:pPr lvl="2">
@@ -2601,7 +2509,6 @@
               <a:rPr lang="ko-KR" altLang="en-US"/>
               <a:t>셋째 수준</a:t>
             </a:r>
-            <a:endParaRPr lang="ko-KR" altLang="en-US"/>
           </a:p>
           <a:p>
             <a:pPr lvl="3">
@@ -2611,7 +2518,6 @@
               <a:rPr lang="ko-KR" altLang="en-US"/>
               <a:t>넷째 수준</a:t>
             </a:r>
-            <a:endParaRPr lang="ko-KR" altLang="en-US"/>
           </a:p>
           <a:p>
             <a:pPr lvl="4">
@@ -2621,7 +2527,6 @@
               <a:rPr lang="ko-KR" altLang="en-US"/>
               <a:t>다섯째 수준</a:t>
             </a:r>
-            <a:endParaRPr lang="ko-KR" altLang="en-US"/>
           </a:p>
         </p:txBody>
       </p:sp>
@@ -2648,7 +2553,7 @@
               <a:pPr lvl="0">
                 <a:defRPr/>
               </a:pPr>
-              <a:t>2023-12-08</a:t>
+              <a:t>2023-12-27</a:t>
             </a:fld>
             <a:endParaRPr lang="ko-KR" altLang="en-US"/>
           </a:p>
@@ -2672,10 +2577,6 @@
             <a:pPr lvl="0">
               <a:defRPr/>
             </a:pPr>
-            <a:r>
-              <a:rPr lang="ko-KR" altLang="en-US"/>
-              <a:t/>
-            </a:r>
             <a:endParaRPr lang="ko-KR" altLang="en-US"/>
           </a:p>
         </p:txBody>
@@ -2714,12 +2615,12 @@
   <p:clrMapOvr>
     <a:masterClrMapping/>
   </p:clrMapOvr>
-  <p:transition xmlns:mc="http://schemas.openxmlformats.org/markup-compatibility/2006" xmlns:hp="http://schemas.haansoft.com/office/presentation/8.0" mc:Ignorable="hp" hp:hslDur="500"/>
+  <p:transition/>
 </p:sldLayout>
 </file>
 
 <file path=ppt/slideLayouts/slideLayout9.xml><?xml version="1.0" encoding="utf-8"?>
-<p:sldLayout xmlns:r="http://schemas.openxmlformats.org/officeDocument/2006/relationships" xmlns:c="http://schemas.openxmlformats.org/drawingml/2006/chart" xmlns:a="http://schemas.openxmlformats.org/drawingml/2006/main" xmlns:dgm="http://schemas.openxmlformats.org/drawingml/2006/diagram" xmlns:dsp="http://schemas.microsoft.com/office/drawing/2008/diagram" xmlns:p="http://schemas.openxmlformats.org/presentationml/2006/main" showMasterPhAnim="1" matchingName="그림 및 설명" type="picTx" preserve="1">
+<p:sldLayout xmlns:a="http://schemas.openxmlformats.org/drawingml/2006/main" xmlns:r="http://schemas.openxmlformats.org/officeDocument/2006/relationships" xmlns:p="http://schemas.openxmlformats.org/presentationml/2006/main" matchingName="그림 및 설명" type="picTx" preserve="1">
   <p:cSld name="그림 및 설명">
     <p:spTree>
       <p:nvGrpSpPr>
@@ -2742,7 +2643,7 @@
             <a:spLocks noGrp="1"/>
           </p:cNvSpPr>
           <p:nvPr>
-            <p:ph type="title" idx="0"/>
+            <p:ph type="title"/>
           </p:nvPr>
         </p:nvSpPr>
         <p:spPr>
@@ -2766,7 +2667,6 @@
               <a:rPr lang="ko-KR" altLang="en-US"/>
               <a:t>마스터 제목 스타일 편집</a:t>
             </a:r>
-            <a:endParaRPr lang="ko-KR" altLang="en-US"/>
           </a:p>
         </p:txBody>
       </p:sp>
@@ -2834,7 +2734,6 @@
               <a:rPr lang="ko-KR" altLang="en-US"/>
               <a:t>그림</a:t>
             </a:r>
-            <a:endParaRPr lang="ko-KR" altLang="en-US"/>
           </a:p>
         </p:txBody>
       </p:sp>
@@ -2902,7 +2801,6 @@
               <a:rPr lang="ko-KR" altLang="en-US"/>
               <a:t>마스터 텍스트 스타일을 편집합니다</a:t>
             </a:r>
-            <a:endParaRPr lang="ko-KR" altLang="en-US"/>
           </a:p>
         </p:txBody>
       </p:sp>
@@ -2929,7 +2827,7 @@
               <a:pPr lvl="0">
                 <a:defRPr/>
               </a:pPr>
-              <a:t>2023-12-08</a:t>
+              <a:t>2023-12-27</a:t>
             </a:fld>
             <a:endParaRPr lang="ko-KR" altLang="en-US"/>
           </a:p>
@@ -2953,10 +2851,6 @@
             <a:pPr lvl="0">
               <a:defRPr/>
             </a:pPr>
-            <a:r>
-              <a:rPr lang="ko-KR" altLang="en-US"/>
-              <a:t/>
-            </a:r>
             <a:endParaRPr lang="ko-KR" altLang="en-US"/>
           </a:p>
         </p:txBody>
@@ -2995,12 +2889,12 @@
   <p:clrMapOvr>
     <a:masterClrMapping/>
   </p:clrMapOvr>
-  <p:transition xmlns:mc="http://schemas.openxmlformats.org/markup-compatibility/2006" xmlns:hp="http://schemas.haansoft.com/office/presentation/8.0" mc:Ignorable="hp" hp:hslDur="500"/>
+  <p:transition/>
 </p:sldLayout>
 </file>
 
 <file path=ppt/slideMasters/slideMaster1.xml><?xml version="1.0" encoding="utf-8"?>
-<p:sldMaster xmlns:r="http://schemas.openxmlformats.org/officeDocument/2006/relationships" xmlns:c="http://schemas.openxmlformats.org/drawingml/2006/chart" xmlns:a="http://schemas.openxmlformats.org/drawingml/2006/main" xmlns:dgm="http://schemas.openxmlformats.org/drawingml/2006/diagram" xmlns:dsp="http://schemas.microsoft.com/office/drawing/2008/diagram" xmlns:p="http://schemas.openxmlformats.org/presentationml/2006/main">
+<p:sldMaster xmlns:a="http://schemas.openxmlformats.org/drawingml/2006/main" xmlns:r="http://schemas.openxmlformats.org/officeDocument/2006/relationships" xmlns:p="http://schemas.openxmlformats.org/presentationml/2006/main">
   <p:cSld name="한컴오피스">
     <p:bg>
       <p:bgRef idx="1001">
@@ -3028,7 +2922,7 @@
             <a:spLocks noGrp="1"/>
           </p:cNvSpPr>
           <p:nvPr>
-            <p:ph type="title" idx="0"/>
+            <p:ph type="title"/>
           </p:nvPr>
         </p:nvSpPr>
         <p:spPr>
@@ -3053,7 +2947,6 @@
               <a:rPr lang="ko-KR" altLang="en-US"/>
               <a:t>마스터 제목 스타일 편집</a:t>
             </a:r>
-            <a:endParaRPr lang="ko-KR" altLang="en-US"/>
           </a:p>
         </p:txBody>
       </p:sp>
@@ -3089,7 +2982,6 @@
               <a:rPr lang="ko-KR" altLang="en-US"/>
               <a:t>마스터 텍스트 스타일을 편집합니다</a:t>
             </a:r>
-            <a:endParaRPr lang="ko-KR" altLang="en-US"/>
           </a:p>
           <a:p>
             <a:pPr lvl="1">
@@ -3099,7 +2991,6 @@
               <a:rPr lang="ko-KR" altLang="en-US"/>
               <a:t>둘째 수준</a:t>
             </a:r>
-            <a:endParaRPr lang="ko-KR" altLang="en-US"/>
           </a:p>
           <a:p>
             <a:pPr lvl="2">
@@ -3109,7 +3000,6 @@
               <a:rPr lang="ko-KR" altLang="en-US"/>
               <a:t>셋째 수준</a:t>
             </a:r>
-            <a:endParaRPr lang="ko-KR" altLang="en-US"/>
           </a:p>
           <a:p>
             <a:pPr lvl="3">
@@ -3119,7 +3009,6 @@
               <a:rPr lang="ko-KR" altLang="en-US"/>
               <a:t>넷째 수준</a:t>
             </a:r>
-            <a:endParaRPr lang="ko-KR" altLang="en-US"/>
           </a:p>
           <a:p>
             <a:pPr lvl="4">
@@ -3129,7 +3018,6 @@
               <a:rPr lang="ko-KR" altLang="en-US"/>
               <a:t>다섯째 수준</a:t>
             </a:r>
-            <a:endParaRPr lang="ko-KR" altLang="en-US"/>
           </a:p>
         </p:txBody>
       </p:sp>
@@ -3174,7 +3062,7 @@
               <a:pPr lvl="0">
                 <a:defRPr/>
               </a:pPr>
-              <a:t>2023-12-08</a:t>
+              <a:t>2023-12-27</a:t>
             </a:fld>
             <a:endParaRPr lang="ko-KR" altLang="en-US"/>
           </a:p>
@@ -3216,10 +3104,6 @@
             <a:pPr lvl="0">
               <a:defRPr/>
             </a:pPr>
-            <a:r>
-              <a:rPr lang="ko-KR" altLang="en-US"/>
-              <a:t/>
-            </a:r>
             <a:endParaRPr lang="ko-KR" altLang="en-US"/>
           </a:p>
         </p:txBody>
@@ -3288,7 +3172,7 @@
     <p:sldLayoutId id="2147483670" r:id="rId11"/>
     <p:sldLayoutId id="2147483671" r:id="rId12"/>
   </p:sldLayoutIdLst>
-  <p:transition xmlns:mc="http://schemas.openxmlformats.org/markup-compatibility/2006" xmlns:hp="http://schemas.haansoft.com/office/presentation/8.0" mc:Ignorable="hp" hp:hslDur="500"/>
+  <p:transition/>
   <p:hf sldNum="0" hdr="0" ftr="0" dt="0"/>
   <p:txStyles>
     <p:titleStyle>
@@ -3600,7 +3484,7 @@
 </file>
 
 <file path=ppt/slides/slide1.xml><?xml version="1.0" encoding="utf-8"?>
-<p:sld xmlns:r="http://schemas.openxmlformats.org/officeDocument/2006/relationships" xmlns:c="http://schemas.openxmlformats.org/drawingml/2006/chart" xmlns:a="http://schemas.openxmlformats.org/drawingml/2006/main" xmlns:dgm="http://schemas.openxmlformats.org/drawingml/2006/diagram" xmlns:dsp="http://schemas.microsoft.com/office/drawing/2008/diagram" xmlns:p="http://schemas.openxmlformats.org/presentationml/2006/main">
+<p:sld xmlns:a="http://schemas.openxmlformats.org/drawingml/2006/main" xmlns:r="http://schemas.openxmlformats.org/officeDocument/2006/relationships" xmlns:p="http://schemas.openxmlformats.org/presentationml/2006/main">
   <p:cSld>
     <p:spTree>
       <p:nvGrpSpPr>
@@ -3623,7 +3507,7 @@
             <a:spLocks noGrp="1"/>
           </p:cNvSpPr>
           <p:nvPr>
-            <p:ph type="ctrTitle" idx="0"/>
+            <p:ph type="ctrTitle"/>
           </p:nvPr>
         </p:nvSpPr>
         <p:spPr/>
@@ -3638,7 +3522,6 @@
               <a:rPr lang="ko-KR" altLang="en-US"/>
               <a:t>유도 시스템</a:t>
             </a:r>
-            <a:endParaRPr lang="ko-KR" altLang="en-US"/>
           </a:p>
         </p:txBody>
       </p:sp>
@@ -3647,19 +3530,19 @@
   <p:clrMapOvr>
     <a:masterClrMapping/>
   </p:clrMapOvr>
-  <mc:AlternateContent xmlns:mc="http://schemas.openxmlformats.org/markup-compatibility/2006">
-    <mc:Choice xmlns:p14="http://schemas.microsoft.com/office/powerpoint/2010/main" Requires="p14">
-      <p:transition xmlns:mc="http://schemas.openxmlformats.org/markup-compatibility/2006" xmlns:p14="http://schemas.microsoft.com/office/powerpoint/2010/main" mc:Ignorable="p14" p14:dur="500"/>
+  <mc:AlternateContent xmlns:mc="http://schemas.openxmlformats.org/markup-compatibility/2006" xmlns:p14="http://schemas.microsoft.com/office/powerpoint/2010/main">
+    <mc:Choice Requires="p14">
+      <p:transition/>
     </mc:Choice>
-    <mc:Fallback>
+    <mc:Fallback xmlns:dsp="http://schemas.microsoft.com/office/drawing/2008/diagram" xmlns:dgm="http://schemas.openxmlformats.org/drawingml/2006/diagram" xmlns:c="http://schemas.openxmlformats.org/drawingml/2006/chart" xmlns="">
       <p:transition/>
     </mc:Fallback>
   </mc:AlternateContent>
 </p:sld>
 </file>
 
-<file path=ppt/slides/slide10.xml><?xml version="1.0" encoding="utf-8"?>
-<p:sld xmlns:r="http://schemas.openxmlformats.org/officeDocument/2006/relationships" xmlns:c="http://schemas.openxmlformats.org/drawingml/2006/chart" xmlns:a="http://schemas.openxmlformats.org/drawingml/2006/main" xmlns:dgm="http://schemas.openxmlformats.org/drawingml/2006/diagram" xmlns:dsp="http://schemas.microsoft.com/office/drawing/2008/diagram" xmlns:p="http://schemas.openxmlformats.org/presentationml/2006/main">
+<file path=ppt/slides/slide2.xml><?xml version="1.0" encoding="utf-8"?>
+<p:sld xmlns:a="http://schemas.openxmlformats.org/drawingml/2006/main" xmlns:r="http://schemas.openxmlformats.org/officeDocument/2006/relationships" xmlns:p="http://schemas.openxmlformats.org/presentationml/2006/main">
   <p:cSld>
     <p:spTree>
       <p:nvGrpSpPr>
@@ -3682,22 +3565,21 @@
             <a:spLocks noGrp="1"/>
           </p:cNvSpPr>
           <p:nvPr>
-            <p:ph type="title" idx="0"/>
-          </p:nvPr>
-        </p:nvSpPr>
-        <p:spPr/>
-        <p:txBody>
-          <a:bodyPr/>
-          <a:lstStyle/>
-          <a:p>
-            <a:pPr lvl="0">
-              <a:defRPr/>
-            </a:pPr>
-            <a:r>
-              <a:rPr lang="ko-KR" altLang="en-US"/>
-              <a:t>다시하기</a:t>
-            </a:r>
-            <a:endParaRPr lang="ko-KR" altLang="en-US"/>
+            <p:ph type="title"/>
+          </p:nvPr>
+        </p:nvSpPr>
+        <p:spPr/>
+        <p:txBody>
+          <a:bodyPr/>
+          <a:lstStyle/>
+          <a:p>
+            <a:pPr lvl="0" algn="l">
+              <a:defRPr/>
+            </a:pPr>
+            <a:r>
+              <a:rPr lang="ko-KR" altLang="en-US"/>
+              <a:t>목차</a:t>
+            </a:r>
           </a:p>
         </p:txBody>
       </p:sp>
@@ -3713,75 +3595,45 @@
         </p:nvSpPr>
         <p:spPr/>
         <p:txBody>
-          <a:bodyPr>
-            <a:normAutofit lnSpcReduction="10000"/>
-          </a:bodyPr>
-          <a:lstStyle/>
-          <a:p>
-            <a:pPr lvl="0">
-              <a:defRPr/>
-            </a:pPr>
-            <a:r>
-              <a:rPr lang="ko-KR" altLang="en-US"/>
-              <a:t>주인공이 죽는 경우에만 다시하며 그렇지 않은 경우에는 분기가 갈림</a:t>
-            </a:r>
-            <a:r>
-              <a:rPr lang="en-US" altLang="ko-KR"/>
-              <a:t>.</a:t>
-            </a:r>
-            <a:endParaRPr lang="en-US" altLang="ko-KR"/>
-          </a:p>
-          <a:p>
-            <a:pPr lvl="0">
-              <a:defRPr/>
-            </a:pPr>
-            <a:endParaRPr lang="en-US" altLang="ko-KR"/>
-          </a:p>
-          <a:p>
-            <a:pPr lvl="0">
-              <a:defRPr/>
-            </a:pPr>
-            <a:r>
-              <a:rPr lang="ko-KR" altLang="en-US"/>
-              <a:t>죽는 경우의 수에 맞는 시나리오를 만들어야 하긴 하지만 분기기 끊기기 때문에 작업량이 훨씬 덜함</a:t>
-            </a:r>
-            <a:r>
-              <a:rPr lang="en-US" altLang="ko-KR"/>
-              <a:t>.</a:t>
-            </a:r>
-            <a:endParaRPr lang="en-US" altLang="ko-KR"/>
-          </a:p>
-          <a:p>
-            <a:pPr lvl="0">
-              <a:defRPr/>
-            </a:pPr>
-            <a:endParaRPr lang="en-US" altLang="ko-KR"/>
-          </a:p>
-          <a:p>
-            <a:pPr lvl="0">
-              <a:defRPr/>
-            </a:pPr>
-            <a:r>
-              <a:rPr lang="ko-KR" altLang="en-US"/>
-              <a:t>전투</a:t>
-            </a:r>
-            <a:r>
-              <a:rPr lang="en-US" altLang="ko-KR"/>
-              <a:t>, </a:t>
-            </a:r>
-            <a:r>
-              <a:rPr lang="ko-KR" altLang="en-US"/>
-              <a:t>배고픔이나 목마름 혹은 더위나 추위</a:t>
-            </a:r>
-            <a:r>
-              <a:rPr lang="en-US" altLang="ko-KR"/>
-              <a:t>, </a:t>
-            </a:r>
-            <a:r>
-              <a:rPr lang="ko-KR" altLang="en-US"/>
-              <a:t>가스 중독 등 여러 요소를 넣을 생각인데 어떻게 일관성을 유지할지는 고민 중</a:t>
-            </a:r>
-            <a:endParaRPr lang="ko-KR" altLang="en-US"/>
+          <a:bodyPr/>
+          <a:lstStyle/>
+          <a:p>
+            <a:pPr lvl="0">
+              <a:defRPr/>
+            </a:pPr>
+            <a:r>
+              <a:rPr lang="ko-KR" altLang="en-US" dirty="0"/>
+              <a:t>기본 설정</a:t>
+            </a:r>
+            <a:endParaRPr lang="en-US" altLang="ko-KR" dirty="0"/>
+          </a:p>
+          <a:p>
+            <a:pPr lvl="0">
+              <a:defRPr/>
+            </a:pPr>
+            <a:r>
+              <a:rPr lang="ko-KR" altLang="en-US" dirty="0"/>
+              <a:t>유도 기본 컨셉</a:t>
+            </a:r>
+          </a:p>
+          <a:p>
+            <a:pPr lvl="0">
+              <a:defRPr/>
+            </a:pPr>
+            <a:r>
+              <a:rPr lang="ko-KR" altLang="en-US" dirty="0"/>
+              <a:t>계획 모드</a:t>
+            </a:r>
+          </a:p>
+          <a:p>
+            <a:pPr lvl="0">
+              <a:defRPr/>
+            </a:pPr>
+            <a:r>
+              <a:rPr lang="ko-KR" altLang="en-US" dirty="0"/>
+              <a:t>죽음과 다시하기</a:t>
+            </a:r>
+            <a:endParaRPr lang="en-US" altLang="ko-KR" dirty="0"/>
           </a:p>
         </p:txBody>
       </p:sp>
@@ -3790,19 +3642,19 @@
   <p:clrMapOvr>
     <a:masterClrMapping/>
   </p:clrMapOvr>
-  <mc:AlternateContent xmlns:mc="http://schemas.openxmlformats.org/markup-compatibility/2006">
-    <mc:Choice xmlns:p14="http://schemas.microsoft.com/office/powerpoint/2010/main" Requires="p14">
-      <p:transition xmlns:mc="http://schemas.openxmlformats.org/markup-compatibility/2006" xmlns:p14="http://schemas.microsoft.com/office/powerpoint/2010/main" mc:Ignorable="p14" p14:dur="500"/>
+  <mc:AlternateContent xmlns:mc="http://schemas.openxmlformats.org/markup-compatibility/2006" xmlns:p14="http://schemas.microsoft.com/office/powerpoint/2010/main">
+    <mc:Choice Requires="p14">
+      <p:transition/>
     </mc:Choice>
-    <mc:Fallback>
+    <mc:Fallback xmlns:dsp="http://schemas.microsoft.com/office/drawing/2008/diagram" xmlns:dgm="http://schemas.openxmlformats.org/drawingml/2006/diagram" xmlns:c="http://schemas.openxmlformats.org/drawingml/2006/chart" xmlns="">
       <p:transition/>
     </mc:Fallback>
   </mc:AlternateContent>
 </p:sld>
 </file>
 
-<file path=ppt/slides/slide11.xml><?xml version="1.0" encoding="utf-8"?>
-<p:sld xmlns:r="http://schemas.openxmlformats.org/officeDocument/2006/relationships" xmlns:c="http://schemas.openxmlformats.org/drawingml/2006/chart" xmlns:a="http://schemas.openxmlformats.org/drawingml/2006/main" xmlns:dgm="http://schemas.openxmlformats.org/drawingml/2006/diagram" xmlns:dsp="http://schemas.microsoft.com/office/drawing/2008/diagram" xmlns:p="http://schemas.openxmlformats.org/presentationml/2006/main">
+<file path=ppt/slides/slide3.xml><?xml version="1.0" encoding="utf-8"?>
+<p:sld xmlns:a="http://schemas.openxmlformats.org/drawingml/2006/main" xmlns:r="http://schemas.openxmlformats.org/officeDocument/2006/relationships" xmlns:p="http://schemas.openxmlformats.org/presentationml/2006/main">
   <p:cSld>
     <p:spTree>
       <p:nvGrpSpPr>
@@ -3820,33 +3672,41 @@
       </p:grpSpPr>
       <p:sp>
         <p:nvSpPr>
-          <p:cNvPr id="2" name="제목 1"/>
-          <p:cNvSpPr>
-            <a:spLocks noGrp="1"/>
-          </p:cNvSpPr>
-          <p:nvPr>
-            <p:ph type="title" idx="0"/>
-          </p:nvPr>
-        </p:nvSpPr>
-        <p:spPr/>
-        <p:txBody>
-          <a:bodyPr/>
-          <a:lstStyle/>
-          <a:p>
-            <a:pPr>
-              <a:defRPr/>
-            </a:pPr>
-            <a:r>
-              <a:rPr lang="ko-KR" altLang="en-US"/>
-              <a:t>결론</a:t>
-            </a:r>
-            <a:endParaRPr lang="ko-KR" altLang="en-US"/>
-          </a:p>
-        </p:txBody>
-      </p:sp>
-      <p:sp>
-        <p:nvSpPr>
-          <p:cNvPr id="3" name="내용 개체 틀 2"/>
+          <p:cNvPr id="2" name="제목 1">
+            <a:extLst>
+              <a:ext uri="{FF2B5EF4-FFF2-40B4-BE49-F238E27FC236}">
+                <a16:creationId xmlns:a16="http://schemas.microsoft.com/office/drawing/2014/main" id="{6DA92101-57CA-F847-2D92-87378DDDA5D5}"/>
+              </a:ext>
+            </a:extLst>
+          </p:cNvPr>
+          <p:cNvSpPr>
+            <a:spLocks noGrp="1"/>
+          </p:cNvSpPr>
+          <p:nvPr>
+            <p:ph type="title"/>
+          </p:nvPr>
+        </p:nvSpPr>
+        <p:spPr/>
+        <p:txBody>
+          <a:bodyPr/>
+          <a:lstStyle/>
+          <a:p>
+            <a:r>
+              <a:rPr lang="ko-KR" altLang="en-US" dirty="0"/>
+              <a:t>설정</a:t>
+            </a:r>
+          </a:p>
+        </p:txBody>
+      </p:sp>
+      <p:sp>
+        <p:nvSpPr>
+          <p:cNvPr id="3" name="내용 개체 틀 2">
+            <a:extLst>
+              <a:ext uri="{FF2B5EF4-FFF2-40B4-BE49-F238E27FC236}">
+                <a16:creationId xmlns:a16="http://schemas.microsoft.com/office/drawing/2014/main" id="{C6031568-94C7-6A3B-92E6-096D4D40A56F}"/>
+              </a:ext>
+            </a:extLst>
+          </p:cNvPr>
           <p:cNvSpPr>
             <a:spLocks noGrp="1"/>
           </p:cNvSpPr>
@@ -3856,70 +3716,89 @@
         </p:nvSpPr>
         <p:spPr/>
         <p:txBody>
-          <a:bodyPr/>
-          <a:lstStyle/>
-          <a:p>
-            <a:pPr>
-              <a:defRPr/>
-            </a:pPr>
-            <a:r>
-              <a:rPr lang="ko-KR" altLang="en-US"/>
-              <a:t>계획 모드에서 플레이어가 어떤 선택을 했을 경우 기대하는 결과를 보여줘야 한다</a:t>
-            </a:r>
-            <a:r>
-              <a:rPr lang="en-US" altLang="ko-KR"/>
+          <a:bodyPr>
+            <a:normAutofit/>
+          </a:bodyPr>
+          <a:lstStyle/>
+          <a:p>
+            <a:r>
+              <a:rPr lang="ko-KR" altLang="en-US" dirty="0"/>
+              <a:t>망하기 직전인 세계에 이를 지킬 수 있는 인물과 플레이어를 연결해주는 중개자가 있음</a:t>
+            </a:r>
+            <a:r>
+              <a:rPr lang="en-US" altLang="ko-KR" dirty="0"/>
+              <a:t>. </a:t>
+            </a:r>
+          </a:p>
+          <a:p>
+            <a:endParaRPr lang="en-US" altLang="ko-KR" dirty="0"/>
+          </a:p>
+          <a:p>
+            <a:r>
+              <a:rPr lang="ko-KR" altLang="en-US" dirty="0"/>
+              <a:t>원래라면 멸망할 세상이지만 플레이어의 개입을 통해 주인공의 행동을 바꿔 세상을 구할 수 있음</a:t>
+            </a:r>
+            <a:r>
+              <a:rPr lang="en-US" altLang="ko-KR" dirty="0"/>
               <a:t>.</a:t>
             </a:r>
-            <a:r>
-              <a:rPr lang="ko-KR" altLang="en-US"/>
-              <a:t> 우린 그걸 예측하거나 만들어야 한다</a:t>
-            </a:r>
-            <a:r>
-              <a:rPr lang="en-US" altLang="ko-KR"/>
+          </a:p>
+          <a:p>
+            <a:endParaRPr lang="en-US" altLang="ko-KR" dirty="0"/>
+          </a:p>
+          <a:p>
+            <a:r>
+              <a:rPr lang="ko-KR" altLang="en-US" dirty="0"/>
+              <a:t>단</a:t>
+            </a:r>
+            <a:r>
+              <a:rPr lang="en-US" altLang="ko-KR" dirty="0"/>
+              <a:t>, ‘</a:t>
+            </a:r>
+            <a:r>
+              <a:rPr lang="ko-KR" altLang="en-US" dirty="0"/>
+              <a:t>일어날 수 있는 일</a:t>
+            </a:r>
+            <a:r>
+              <a:rPr lang="en-US" altLang="ko-KR" dirty="0"/>
+              <a:t>’</a:t>
+            </a:r>
+            <a:r>
+              <a:rPr lang="ko-KR" altLang="en-US" dirty="0"/>
+              <a:t>만이 생겨야 함</a:t>
+            </a:r>
+            <a:r>
+              <a:rPr lang="en-US" altLang="ko-KR" dirty="0"/>
+              <a:t>. </a:t>
+            </a:r>
+            <a:r>
+              <a:rPr lang="ko-KR" altLang="en-US" dirty="0"/>
+              <a:t>즉 플레이어의 개입은 새로운 운명을 만드는 게 아니라 바꾸는 것</a:t>
+            </a:r>
+            <a:r>
+              <a:rPr lang="en-US" altLang="ko-KR" dirty="0"/>
               <a:t>.</a:t>
             </a:r>
-            <a:endParaRPr lang="en-US" altLang="ko-KR"/>
-          </a:p>
-          <a:p>
-            <a:pPr>
-              <a:defRPr/>
-            </a:pPr>
-            <a:endParaRPr lang="en-US" altLang="ko-KR"/>
-          </a:p>
-          <a:p>
-            <a:pPr>
-              <a:defRPr/>
-            </a:pPr>
-            <a:r>
-              <a:rPr lang="ko-KR" altLang="en-US"/>
-              <a:t>죽음과 다시하기를 통해 분기를 줄일 수 있다</a:t>
-            </a:r>
-            <a:r>
-              <a:rPr lang="en-US" altLang="ko-KR"/>
-              <a:t>.</a:t>
-            </a:r>
-            <a:endParaRPr lang="en-US" altLang="ko-KR"/>
+            <a:endParaRPr lang="ko-KR" altLang="en-US" dirty="0"/>
           </a:p>
         </p:txBody>
       </p:sp>
     </p:spTree>
+    <p:extLst>
+      <p:ext uri="{BB962C8B-B14F-4D97-AF65-F5344CB8AC3E}">
+        <p14:creationId xmlns:p14="http://schemas.microsoft.com/office/powerpoint/2010/main" val="330862239"/>
+      </p:ext>
+    </p:extLst>
   </p:cSld>
   <p:clrMapOvr>
     <a:masterClrMapping/>
   </p:clrMapOvr>
-  <mc:AlternateContent xmlns:mc="http://schemas.openxmlformats.org/markup-compatibility/2006">
-    <mc:Choice xmlns:p14="http://schemas.microsoft.com/office/powerpoint/2010/main" Requires="p14">
-      <p:transition xmlns:mc="http://schemas.openxmlformats.org/markup-compatibility/2006" xmlns:p14="http://schemas.microsoft.com/office/powerpoint/2010/main" mc:Ignorable="p14" p14:dur="500"/>
-    </mc:Choice>
-    <mc:Fallback>
-      <p:transition/>
-    </mc:Fallback>
-  </mc:AlternateContent>
+  <p:transition/>
 </p:sld>
 </file>
 
-<file path=ppt/slides/slide2.xml><?xml version="1.0" encoding="utf-8"?>
-<p:sld xmlns:r="http://schemas.openxmlformats.org/officeDocument/2006/relationships" xmlns:c="http://schemas.openxmlformats.org/drawingml/2006/chart" xmlns:a="http://schemas.openxmlformats.org/drawingml/2006/main" xmlns:dgm="http://schemas.openxmlformats.org/drawingml/2006/diagram" xmlns:dsp="http://schemas.microsoft.com/office/drawing/2008/diagram" xmlns:p="http://schemas.openxmlformats.org/presentationml/2006/main">
+<file path=ppt/slides/slide4.xml><?xml version="1.0" encoding="utf-8"?>
+<p:sld xmlns:a="http://schemas.openxmlformats.org/drawingml/2006/main" xmlns:r="http://schemas.openxmlformats.org/officeDocument/2006/relationships" xmlns:p="http://schemas.openxmlformats.org/presentationml/2006/main">
   <p:cSld>
     <p:spTree>
       <p:nvGrpSpPr>
@@ -3942,22 +3821,21 @@
             <a:spLocks noGrp="1"/>
           </p:cNvSpPr>
           <p:nvPr>
-            <p:ph type="title" idx="0"/>
-          </p:nvPr>
-        </p:nvSpPr>
-        <p:spPr/>
-        <p:txBody>
-          <a:bodyPr/>
-          <a:lstStyle/>
-          <a:p>
-            <a:pPr lvl="0" algn="l">
-              <a:defRPr/>
-            </a:pPr>
-            <a:r>
-              <a:rPr lang="ko-KR" altLang="en-US"/>
-              <a:t>목차</a:t>
-            </a:r>
-            <a:endParaRPr lang="ko-KR" altLang="en-US"/>
+            <p:ph type="title"/>
+          </p:nvPr>
+        </p:nvSpPr>
+        <p:spPr/>
+        <p:txBody>
+          <a:bodyPr/>
+          <a:lstStyle/>
+          <a:p>
+            <a:pPr>
+              <a:defRPr/>
+            </a:pPr>
+            <a:r>
+              <a:rPr lang="ko-KR" altLang="en-US"/>
+              <a:t>넛지</a:t>
+            </a:r>
           </a:p>
         </p:txBody>
       </p:sp>
@@ -3973,37 +3851,92 @@
         </p:nvSpPr>
         <p:spPr/>
         <p:txBody>
-          <a:bodyPr/>
-          <a:lstStyle/>
-          <a:p>
-            <a:pPr lvl="0">
-              <a:defRPr/>
-            </a:pPr>
-            <a:r>
-              <a:rPr lang="ko-KR" altLang="en-US"/>
-              <a:t>유도 기본 컨셉</a:t>
-            </a:r>
-            <a:endParaRPr lang="ko-KR" altLang="en-US"/>
-          </a:p>
-          <a:p>
-            <a:pPr lvl="0">
-              <a:defRPr/>
-            </a:pPr>
-            <a:r>
-              <a:rPr lang="ko-KR" altLang="en-US"/>
-              <a:t>계획 모드</a:t>
-            </a:r>
-            <a:endParaRPr lang="ko-KR" altLang="en-US"/>
-          </a:p>
-          <a:p>
-            <a:pPr lvl="0">
-              <a:defRPr/>
-            </a:pPr>
-            <a:r>
-              <a:rPr lang="ko-KR" altLang="en-US"/>
-              <a:t>죽음과 다시하기</a:t>
-            </a:r>
-            <a:endParaRPr lang="en-US" altLang="ko-KR"/>
+          <a:bodyPr>
+            <a:normAutofit fontScale="92500" lnSpcReduction="20000"/>
+          </a:bodyPr>
+          <a:lstStyle/>
+          <a:p>
+            <a:pPr>
+              <a:defRPr/>
+            </a:pPr>
+            <a:r>
+              <a:rPr lang="ko-KR" altLang="en-US" dirty="0"/>
+              <a:t>은근슬쩍 하는 유도</a:t>
+            </a:r>
+            <a:r>
+              <a:rPr lang="en-US" altLang="ko-KR" dirty="0"/>
+              <a:t>.</a:t>
+            </a:r>
+          </a:p>
+          <a:p>
+            <a:pPr>
+              <a:defRPr/>
+            </a:pPr>
+            <a:endParaRPr lang="en-US" altLang="ko-KR" dirty="0"/>
+          </a:p>
+          <a:p>
+            <a:pPr>
+              <a:defRPr/>
+            </a:pPr>
+            <a:r>
+              <a:rPr lang="ko-KR" altLang="en-US" dirty="0"/>
+              <a:t>플레이어는 자신이 유도하고 있다는 것을 들키면 안 됨</a:t>
+            </a:r>
+            <a:r>
+              <a:rPr lang="en-US" altLang="ko-KR" dirty="0"/>
+              <a:t>.</a:t>
+            </a:r>
+          </a:p>
+          <a:p>
+            <a:pPr marL="0" indent="0">
+              <a:buNone/>
+              <a:defRPr/>
+            </a:pPr>
+            <a:endParaRPr lang="en-US" altLang="ko-KR" dirty="0"/>
+          </a:p>
+          <a:p>
+            <a:pPr lvl="0">
+              <a:defRPr/>
+            </a:pPr>
+            <a:r>
+              <a:rPr lang="ko-KR" altLang="en-US" dirty="0"/>
+              <a:t>유도 설정에 따라 다른 시뮬레이션이 진행됨</a:t>
+            </a:r>
+            <a:r>
+              <a:rPr lang="en-US" altLang="ko-KR" dirty="0"/>
+              <a:t>.</a:t>
+            </a:r>
+          </a:p>
+          <a:p>
+            <a:pPr lvl="0">
+              <a:defRPr/>
+            </a:pPr>
+            <a:endParaRPr lang="en-US" altLang="ko-KR" dirty="0"/>
+          </a:p>
+          <a:p>
+            <a:pPr lvl="0">
+              <a:defRPr/>
+            </a:pPr>
+            <a:r>
+              <a:rPr lang="ko-KR" altLang="en-US" dirty="0"/>
+              <a:t>설정은 날씨나 물건의 위치같이 간접적으로 영향을 줄 수 있는 요소들</a:t>
+            </a:r>
+            <a:endParaRPr lang="en-US" altLang="ko-KR" dirty="0"/>
+          </a:p>
+          <a:p>
+            <a:pPr lvl="0">
+              <a:defRPr/>
+            </a:pPr>
+            <a:endParaRPr lang="en-US" altLang="ko-KR" dirty="0"/>
+          </a:p>
+          <a:p>
+            <a:pPr>
+              <a:defRPr/>
+            </a:pPr>
+            <a:r>
+              <a:rPr lang="ko-KR" altLang="en-US" dirty="0"/>
+              <a:t>유도와 시뮬레이션은 전형적인 예측(행동)과 피드백임</a:t>
+            </a:r>
           </a:p>
         </p:txBody>
       </p:sp>
@@ -4012,19 +3945,19 @@
   <p:clrMapOvr>
     <a:masterClrMapping/>
   </p:clrMapOvr>
-  <mc:AlternateContent xmlns:mc="http://schemas.openxmlformats.org/markup-compatibility/2006">
-    <mc:Choice xmlns:p14="http://schemas.microsoft.com/office/powerpoint/2010/main" Requires="p14">
-      <p:transition xmlns:mc="http://schemas.openxmlformats.org/markup-compatibility/2006" xmlns:p14="http://schemas.microsoft.com/office/powerpoint/2010/main" mc:Ignorable="p14" p14:dur="500"/>
+  <mc:AlternateContent xmlns:mc="http://schemas.openxmlformats.org/markup-compatibility/2006" xmlns:p14="http://schemas.microsoft.com/office/powerpoint/2010/main">
+    <mc:Choice Requires="p14">
+      <p:transition/>
     </mc:Choice>
-    <mc:Fallback>
+    <mc:Fallback xmlns:dsp="http://schemas.microsoft.com/office/drawing/2008/diagram" xmlns:dgm="http://schemas.openxmlformats.org/drawingml/2006/diagram" xmlns:c="http://schemas.openxmlformats.org/drawingml/2006/chart" xmlns="">
       <p:transition/>
     </mc:Fallback>
   </mc:AlternateContent>
 </p:sld>
 </file>
 
-<file path=ppt/slides/slide3.xml><?xml version="1.0" encoding="utf-8"?>
-<p:sld xmlns:r="http://schemas.openxmlformats.org/officeDocument/2006/relationships" xmlns:c="http://schemas.openxmlformats.org/drawingml/2006/chart" xmlns:a="http://schemas.openxmlformats.org/drawingml/2006/main" xmlns:dgm="http://schemas.openxmlformats.org/drawingml/2006/diagram" xmlns:dsp="http://schemas.microsoft.com/office/drawing/2008/diagram" xmlns:p="http://schemas.openxmlformats.org/presentationml/2006/main">
+<file path=ppt/slides/slide5.xml><?xml version="1.0" encoding="utf-8"?>
+<p:sld xmlns:a="http://schemas.openxmlformats.org/drawingml/2006/main" xmlns:r="http://schemas.openxmlformats.org/officeDocument/2006/relationships" xmlns:p="http://schemas.openxmlformats.org/presentationml/2006/main">
   <p:cSld>
     <p:spTree>
       <p:nvGrpSpPr>
@@ -4047,7 +3980,7 @@
             <a:spLocks noGrp="1"/>
           </p:cNvSpPr>
           <p:nvPr>
-            <p:ph type="title" idx="0"/>
+            <p:ph type="title"/>
           </p:nvPr>
         </p:nvSpPr>
         <p:spPr/>
@@ -4060,9 +3993,8 @@
             </a:pPr>
             <a:r>
               <a:rPr lang="ko-KR" altLang="en-US"/>
-              <a:t>넛지</a:t>
-            </a:r>
-            <a:endParaRPr lang="ko-KR" altLang="en-US"/>
+              <a:t>정보 제공</a:t>
+            </a:r>
           </a:p>
         </p:txBody>
       </p:sp>
@@ -4078,59 +4010,38 @@
         </p:nvSpPr>
         <p:spPr/>
         <p:txBody>
-          <a:bodyPr>
-            <a:normAutofit lnSpcReduction="10000"/>
-          </a:bodyPr>
-          <a:lstStyle/>
-          <a:p>
-            <a:pPr>
-              <a:defRPr/>
-            </a:pPr>
-            <a:r>
-              <a:rPr lang="ko-KR" altLang="en-US"/>
-              <a:t>은근슬쩍 하는 유도</a:t>
-            </a:r>
-            <a:r>
-              <a:rPr lang="en-US" altLang="ko-KR"/>
-              <a:t>.</a:t>
-            </a:r>
-            <a:endParaRPr lang="en-US" altLang="ko-KR"/>
-          </a:p>
-          <a:p>
-            <a:pPr>
-              <a:defRPr/>
-            </a:pPr>
-            <a:endParaRPr lang="en-US" altLang="ko-KR"/>
-          </a:p>
-          <a:p>
-            <a:pPr lvl="0">
-              <a:defRPr/>
-            </a:pPr>
-            <a:r>
-              <a:rPr lang="ko-KR" altLang="en-US"/>
-              <a:t>유도에 따라 다른 시뮬레이션이 진행됨</a:t>
-            </a:r>
-            <a:r>
-              <a:rPr lang="en-US" altLang="ko-KR"/>
-              <a:t>.</a:t>
-            </a:r>
-            <a:endParaRPr lang="en-US" altLang="ko-KR"/>
-          </a:p>
-          <a:p>
-            <a:pPr lvl="0">
-              <a:defRPr/>
-            </a:pPr>
-            <a:endParaRPr lang="en-US" altLang="ko-KR"/>
-          </a:p>
-          <a:p>
-            <a:pPr>
-              <a:defRPr/>
-            </a:pPr>
-            <a:r>
-              <a:rPr lang="ko-KR" altLang="en-US"/>
-              <a:t>유도와 시뮬레이션은 전형적인 예측(행동)과 피드백임</a:t>
-            </a:r>
-            <a:endParaRPr lang="ko-KR" altLang="en-US"/>
+          <a:bodyPr/>
+          <a:lstStyle/>
+          <a:p>
+            <a:pPr marL="0" lvl="0" indent="0">
+              <a:buNone/>
+              <a:defRPr/>
+            </a:pPr>
+            <a:r>
+              <a:rPr lang="ko-KR" altLang="en-US" dirty="0"/>
+              <a:t>유도 시작 전에 아무것도 바꾸지 않을 경우 실행되는 시뮬레이션을 실행</a:t>
+            </a:r>
+            <a:r>
+              <a:rPr lang="en-US" altLang="ko-KR" dirty="0"/>
+              <a:t>. </a:t>
+            </a:r>
+          </a:p>
+          <a:p>
+            <a:pPr marL="0" lvl="0" indent="0">
+              <a:buNone/>
+              <a:defRPr/>
+            </a:pPr>
+            <a:endParaRPr lang="en-US" altLang="ko-KR" dirty="0"/>
+          </a:p>
+          <a:p>
+            <a:pPr marL="0" lvl="0" indent="0">
+              <a:buNone/>
+              <a:defRPr/>
+            </a:pPr>
+            <a:r>
+              <a:rPr lang="ko-KR" altLang="en-US" dirty="0"/>
+              <a:t>또한 주인공의 할 일 목록을 보여줘서 어떤 방향으로 유도해야 하는지 힌트를 제공.</a:t>
+            </a:r>
           </a:p>
         </p:txBody>
       </p:sp>
@@ -4139,19 +4050,19 @@
   <p:clrMapOvr>
     <a:masterClrMapping/>
   </p:clrMapOvr>
-  <mc:AlternateContent xmlns:mc="http://schemas.openxmlformats.org/markup-compatibility/2006">
-    <mc:Choice xmlns:p14="http://schemas.microsoft.com/office/powerpoint/2010/main" Requires="p14">
-      <p:transition xmlns:mc="http://schemas.openxmlformats.org/markup-compatibility/2006" xmlns:p14="http://schemas.microsoft.com/office/powerpoint/2010/main" mc:Ignorable="p14" p14:dur="500"/>
+  <mc:AlternateContent xmlns:mc="http://schemas.openxmlformats.org/markup-compatibility/2006" xmlns:p14="http://schemas.microsoft.com/office/powerpoint/2010/main">
+    <mc:Choice Requires="p14">
+      <p:transition/>
     </mc:Choice>
-    <mc:Fallback>
+    <mc:Fallback xmlns:dsp="http://schemas.microsoft.com/office/drawing/2008/diagram" xmlns:dgm="http://schemas.openxmlformats.org/drawingml/2006/diagram" xmlns:c="http://schemas.openxmlformats.org/drawingml/2006/chart" xmlns="">
       <p:transition/>
     </mc:Fallback>
   </mc:AlternateContent>
 </p:sld>
 </file>
 
-<file path=ppt/slides/slide4.xml><?xml version="1.0" encoding="utf-8"?>
-<p:sld xmlns:r="http://schemas.openxmlformats.org/officeDocument/2006/relationships" xmlns:c="http://schemas.openxmlformats.org/drawingml/2006/chart" xmlns:a="http://schemas.openxmlformats.org/drawingml/2006/main" xmlns:dgm="http://schemas.openxmlformats.org/drawingml/2006/diagram" xmlns:dsp="http://schemas.microsoft.com/office/drawing/2008/diagram" xmlns:p="http://schemas.openxmlformats.org/presentationml/2006/main">
+<file path=ppt/slides/slide6.xml><?xml version="1.0" encoding="utf-8"?>
+<p:sld xmlns:a="http://schemas.openxmlformats.org/drawingml/2006/main" xmlns:r="http://schemas.openxmlformats.org/officeDocument/2006/relationships" xmlns:p="http://schemas.openxmlformats.org/presentationml/2006/main">
   <p:cSld>
     <p:spTree>
       <p:nvGrpSpPr>
@@ -4174,22 +4085,21 @@
             <a:spLocks noGrp="1"/>
           </p:cNvSpPr>
           <p:nvPr>
-            <p:ph type="title" idx="0"/>
-          </p:nvPr>
-        </p:nvSpPr>
-        <p:spPr/>
-        <p:txBody>
-          <a:bodyPr/>
-          <a:lstStyle/>
-          <a:p>
-            <a:pPr>
-              <a:defRPr/>
-            </a:pPr>
-            <a:r>
-              <a:rPr lang="ko-KR" altLang="en-US"/>
-              <a:t>예측의 예측</a:t>
-            </a:r>
-            <a:endParaRPr lang="ko-KR" altLang="en-US"/>
+            <p:ph type="title"/>
+          </p:nvPr>
+        </p:nvSpPr>
+        <p:spPr/>
+        <p:txBody>
+          <a:bodyPr/>
+          <a:lstStyle/>
+          <a:p>
+            <a:pPr lvl="0">
+              <a:defRPr/>
+            </a:pPr>
+            <a:r>
+              <a:rPr lang="ko-KR" altLang="en-US" dirty="0"/>
+              <a:t>다시하기</a:t>
+            </a:r>
           </a:p>
         </p:txBody>
       </p:sp>
@@ -4205,73 +4115,49 @@
         </p:nvSpPr>
         <p:spPr/>
         <p:txBody>
-          <a:bodyPr/>
-          <a:lstStyle/>
-          <a:p>
-            <a:pPr>
-              <a:defRPr/>
-            </a:pPr>
-            <a:r>
-              <a:rPr lang="ko-KR" altLang="en-US"/>
-              <a:t>플레이어가 한 유도의 적절한 피드백을 보여줘야 함.</a:t>
-            </a:r>
-            <a:endParaRPr lang="ko-KR" altLang="en-US"/>
-          </a:p>
-          <a:p>
-            <a:pPr>
-              <a:defRPr/>
-            </a:pPr>
-            <a:endParaRPr lang="ko-KR" altLang="en-US"/>
-          </a:p>
-          <a:p>
-            <a:pPr>
-              <a:defRPr/>
-            </a:pPr>
-            <a:r>
-              <a:rPr lang="ko-KR" altLang="en-US"/>
-              <a:t>사람은 기본적으로 자신의 예측이 맞기를 기대함. 즉</a:t>
-            </a:r>
-            <a:r>
-              <a:rPr lang="en-US" altLang="ko-KR"/>
-              <a:t>,</a:t>
-            </a:r>
-            <a:r>
-              <a:rPr lang="ko-KR" altLang="en-US"/>
-              <a:t> 유도에 맞는 시뮬레이션을 보여줘야 함</a:t>
-            </a:r>
-            <a:r>
-              <a:rPr lang="en-US" altLang="ko-KR"/>
+          <a:bodyPr>
+            <a:normAutofit/>
+          </a:bodyPr>
+          <a:lstStyle/>
+          <a:p>
+            <a:pPr lvl="0">
+              <a:defRPr/>
+            </a:pPr>
+            <a:r>
+              <a:rPr lang="ko-KR" altLang="en-US" dirty="0"/>
+              <a:t>원래는 다시하기라는 개념 없이 게임을 </a:t>
+            </a:r>
+            <a:r>
+              <a:rPr lang="ko-KR" altLang="en-US" dirty="0" err="1"/>
+              <a:t>만드려했는데</a:t>
+            </a:r>
+            <a:r>
+              <a:rPr lang="ko-KR" altLang="en-US" dirty="0"/>
+              <a:t> 이 경우 엄청난 수의 분기가 필요</a:t>
+            </a:r>
+            <a:r>
+              <a:rPr lang="en-US" altLang="ko-KR" dirty="0"/>
               <a:t>.</a:t>
             </a:r>
-            <a:endParaRPr lang="en-US" altLang="ko-KR"/>
-          </a:p>
-          <a:p>
-            <a:pPr>
-              <a:defRPr/>
-            </a:pPr>
-            <a:endParaRPr lang="ko-KR" altLang="en-US"/>
-          </a:p>
-          <a:p>
-            <a:pPr>
-              <a:defRPr/>
-            </a:pPr>
-            <a:r>
-              <a:rPr lang="ko-KR" altLang="en-US"/>
-              <a:t>이때 우리는 플레이어의 예측을 예측해야 함. 아니면 만들거나</a:t>
-            </a:r>
-            <a:r>
-              <a:rPr lang="en-US" altLang="ko-KR"/>
+          </a:p>
+          <a:p>
+            <a:pPr lvl="0">
+              <a:defRPr/>
+            </a:pPr>
+            <a:endParaRPr lang="en-US" altLang="ko-KR" dirty="0"/>
+          </a:p>
+          <a:p>
+            <a:pPr lvl="0">
+              <a:defRPr/>
+            </a:pPr>
+            <a:r>
+              <a:rPr lang="ko-KR" altLang="en-US" dirty="0"/>
+              <a:t>선형적인 스토리에 집중하는 게임인데 너무 많은 분기를 만들면 몇몇 파트의 밀도나 퀄리티도 떨어질 수 있음</a:t>
+            </a:r>
+            <a:r>
+              <a:rPr lang="en-US" altLang="ko-KR" dirty="0"/>
               <a:t>.</a:t>
             </a:r>
-            <a:r>
-              <a:rPr lang="ko-KR" altLang="en-US"/>
-              <a:t> 즉 유도의 유도를 해야 함</a:t>
-            </a:r>
-            <a:r>
-              <a:rPr lang="en-US" altLang="ko-KR"/>
-              <a:t>.</a:t>
-            </a:r>
-            <a:endParaRPr lang="en-US" altLang="ko-KR"/>
           </a:p>
         </p:txBody>
       </p:sp>
@@ -4280,170 +4166,19 @@
   <p:clrMapOvr>
     <a:masterClrMapping/>
   </p:clrMapOvr>
-  <mc:AlternateContent xmlns:mc="http://schemas.openxmlformats.org/markup-compatibility/2006">
-    <mc:Choice xmlns:p14="http://schemas.microsoft.com/office/powerpoint/2010/main" Requires="p14">
-      <p:transition xmlns:mc="http://schemas.openxmlformats.org/markup-compatibility/2006" xmlns:p14="http://schemas.microsoft.com/office/powerpoint/2010/main" mc:Ignorable="p14" p14:dur="500"/>
+  <mc:AlternateContent xmlns:mc="http://schemas.openxmlformats.org/markup-compatibility/2006" xmlns:p14="http://schemas.microsoft.com/office/powerpoint/2010/main">
+    <mc:Choice Requires="p14">
+      <p:transition/>
     </mc:Choice>
-    <mc:Fallback>
+    <mc:Fallback xmlns:dsp="http://schemas.microsoft.com/office/drawing/2008/diagram" xmlns:dgm="http://schemas.openxmlformats.org/drawingml/2006/diagram" xmlns:c="http://schemas.openxmlformats.org/drawingml/2006/chart" xmlns="">
       <p:transition/>
     </mc:Fallback>
   </mc:AlternateContent>
 </p:sld>
 </file>
 
-<file path=ppt/slides/slide5.xml><?xml version="1.0" encoding="utf-8"?>
-<p:sld xmlns:r="http://schemas.openxmlformats.org/officeDocument/2006/relationships" xmlns:c="http://schemas.openxmlformats.org/drawingml/2006/chart" xmlns:a="http://schemas.openxmlformats.org/drawingml/2006/main" xmlns:dgm="http://schemas.openxmlformats.org/drawingml/2006/diagram" xmlns:dsp="http://schemas.microsoft.com/office/drawing/2008/diagram" xmlns:p="http://schemas.openxmlformats.org/presentationml/2006/main">
-  <p:cSld>
-    <p:spTree>
-      <p:nvGrpSpPr>
-        <p:cNvPr id="1" name=""/>
-        <p:cNvGrpSpPr/>
-        <p:nvPr/>
-      </p:nvGrpSpPr>
-      <p:grpSpPr>
-        <a:xfrm>
-          <a:off x="0" y="0"/>
-          <a:ext cx="0" cy="0"/>
-          <a:chOff x="0" y="0"/>
-          <a:chExt cx="0" cy="0"/>
-        </a:xfrm>
-      </p:grpSpPr>
-      <p:sp>
-        <p:nvSpPr>
-          <p:cNvPr id="2" name="제목 1"/>
-          <p:cNvSpPr>
-            <a:spLocks noGrp="1"/>
-          </p:cNvSpPr>
-          <p:nvPr>
-            <p:ph type="title" idx="0"/>
-          </p:nvPr>
-        </p:nvSpPr>
-        <p:spPr/>
-        <p:txBody>
-          <a:bodyPr/>
-          <a:lstStyle/>
-          <a:p>
-            <a:pPr lvl="0">
-              <a:defRPr/>
-            </a:pPr>
-            <a:r>
-              <a:rPr lang="ko-KR" altLang="en-US"/>
-              <a:t>계획 모드</a:t>
-            </a:r>
-            <a:endParaRPr lang="ko-KR" altLang="en-US"/>
-          </a:p>
-        </p:txBody>
-      </p:sp>
-      <p:sp>
-        <p:nvSpPr>
-          <p:cNvPr id="3" name="내용 개체 틀 2"/>
-          <p:cNvSpPr>
-            <a:spLocks noGrp="1"/>
-          </p:cNvSpPr>
-          <p:nvPr>
-            <p:ph idx="1"/>
-          </p:nvPr>
-        </p:nvSpPr>
-        <p:spPr/>
-        <p:txBody>
-          <a:bodyPr>
-            <a:normAutofit lnSpcReduction="10000"/>
-          </a:bodyPr>
-          <a:lstStyle/>
-          <a:p>
-            <a:pPr lvl="0">
-              <a:defRPr/>
-            </a:pPr>
-            <a:r>
-              <a:rPr lang="ko-KR" altLang="en-US"/>
-              <a:t>소리</a:t>
-            </a:r>
-            <a:r>
-              <a:rPr lang="en-US" altLang="ko-KR"/>
-              <a:t>, </a:t>
-            </a:r>
-            <a:r>
-              <a:rPr lang="ko-KR" altLang="en-US"/>
-              <a:t>물건 배치</a:t>
-            </a:r>
-            <a:r>
-              <a:rPr lang="en-US" altLang="ko-KR"/>
-              <a:t>, </a:t>
-            </a:r>
-            <a:r>
-              <a:rPr lang="ko-KR" altLang="en-US"/>
-              <a:t>조명</a:t>
-            </a:r>
-            <a:r>
-              <a:rPr lang="en-US" altLang="ko-KR"/>
-              <a:t> </a:t>
-            </a:r>
-            <a:r>
-              <a:rPr lang="ko-KR" altLang="en-US"/>
-              <a:t>등의 기능들을 순차적으로 조작</a:t>
-            </a:r>
-            <a:r>
-              <a:rPr lang="en-US" altLang="ko-KR"/>
-              <a:t>.</a:t>
-            </a:r>
-            <a:endParaRPr lang="en-US" altLang="ko-KR"/>
-          </a:p>
-          <a:p>
-            <a:pPr lvl="0">
-              <a:defRPr/>
-            </a:pPr>
-            <a:endParaRPr lang="en-US" altLang="ko-KR"/>
-          </a:p>
-          <a:p>
-            <a:pPr lvl="0">
-              <a:defRPr/>
-            </a:pPr>
-            <a:r>
-              <a:rPr lang="ko-KR" altLang="en-US"/>
-              <a:t>카메라는 각 기능이 영향을 주는 공간에 포커스되면 설정 시 그것이 주는 영향을 미리 보여줘야 함</a:t>
-            </a:r>
-            <a:r>
-              <a:rPr lang="en-US" altLang="ko-KR"/>
-              <a:t>.</a:t>
-            </a:r>
-            <a:endParaRPr lang="en-US" altLang="ko-KR"/>
-          </a:p>
-          <a:p>
-            <a:pPr lvl="0">
-              <a:defRPr/>
-            </a:pPr>
-            <a:endParaRPr lang="en-US" altLang="ko-KR"/>
-          </a:p>
-          <a:p>
-            <a:pPr lvl="0">
-              <a:defRPr/>
-            </a:pPr>
-            <a:r>
-              <a:rPr lang="ko-KR" altLang="en-US"/>
-              <a:t>시뮬레이션 시작 전까지는 수정 가능</a:t>
-            </a:r>
-            <a:endParaRPr lang="ko-KR" altLang="en-US"/>
-          </a:p>
-        </p:txBody>
-      </p:sp>
-    </p:spTree>
-  </p:cSld>
-  <p:clrMapOvr>
-    <a:masterClrMapping/>
-  </p:clrMapOvr>
-  <mc:AlternateContent xmlns:mc="http://schemas.openxmlformats.org/markup-compatibility/2006">
-    <mc:Choice xmlns:p14="http://schemas.microsoft.com/office/powerpoint/2010/main" Requires="p14">
-      <p:transition xmlns:mc="http://schemas.openxmlformats.org/markup-compatibility/2006" xmlns:p14="http://schemas.microsoft.com/office/powerpoint/2010/main" mc:Ignorable="p14" p14:dur="500"/>
-    </mc:Choice>
-    <mc:Fallback>
-      <p:transition/>
-    </mc:Fallback>
-  </mc:AlternateContent>
-</p:sld>
-</file>
-
-<file path=ppt/slides/slide6.xml><?xml version="1.0" encoding="utf-8"?>
-<p:sld xmlns:r="http://schemas.openxmlformats.org/officeDocument/2006/relationships" xmlns:c="http://schemas.openxmlformats.org/drawingml/2006/chart" xmlns:a="http://schemas.openxmlformats.org/drawingml/2006/main" xmlns:dgm="http://schemas.openxmlformats.org/drawingml/2006/diagram" xmlns:dsp="http://schemas.microsoft.com/office/drawing/2008/diagram" xmlns:p="http://schemas.openxmlformats.org/presentationml/2006/main">
+<file path=ppt/slides/slide7.xml><?xml version="1.0" encoding="utf-8"?>
+<p:sld xmlns:a="http://schemas.openxmlformats.org/drawingml/2006/main" xmlns:r="http://schemas.openxmlformats.org/officeDocument/2006/relationships" xmlns:p="http://schemas.openxmlformats.org/presentationml/2006/main">
   <p:cSld>
     <p:spTree>
       <p:nvGrpSpPr>
@@ -4461,46 +4196,55 @@
       </p:grpSpPr>
       <p:pic>
         <p:nvPicPr>
-          <p:cNvPr id="6" name=""/>
+          <p:cNvPr id="5" name="내용 개체 틀 4">
+            <a:extLst>
+              <a:ext uri="{FF2B5EF4-FFF2-40B4-BE49-F238E27FC236}">
+                <a16:creationId xmlns:a16="http://schemas.microsoft.com/office/drawing/2014/main" id="{7E408EBB-CBA6-131E-8C37-B4442A2C765E}"/>
+              </a:ext>
+            </a:extLst>
+          </p:cNvPr>
           <p:cNvPicPr>
-            <a:picLocks noChangeAspect="1"/>
+            <a:picLocks noGrp="1" noChangeAspect="1"/>
           </p:cNvPicPr>
-          <p:nvPr/>
+          <p:nvPr>
+            <p:ph idx="1"/>
+          </p:nvPr>
         </p:nvPicPr>
-        <p:blipFill rotWithShape="1">
-          <a:blip r:embed="rId2"/>
+        <p:blipFill>
+          <a:blip r:embed="rId2">
+            <a:extLst>
+              <a:ext uri="{28A0092B-C50C-407E-A947-70E740481C1C}">
+                <a14:useLocalDpi xmlns:a14="http://schemas.microsoft.com/office/drawing/2010/main" val="0"/>
+              </a:ext>
+            </a:extLst>
+          </a:blip>
           <a:stretch>
             <a:fillRect/>
           </a:stretch>
         </p:blipFill>
         <p:spPr>
           <a:xfrm>
-            <a:off x="922261" y="727477"/>
-            <a:ext cx="10633617" cy="5552456"/>
+            <a:off x="1141986" y="1600200"/>
+            <a:ext cx="9908027" cy="4525963"/>
           </a:xfrm>
-          <a:prstGeom prst="rect">
-            <a:avLst/>
-          </a:prstGeom>
         </p:spPr>
       </p:pic>
     </p:spTree>
+    <p:extLst>
+      <p:ext uri="{BB962C8B-B14F-4D97-AF65-F5344CB8AC3E}">
+        <p14:creationId xmlns:p14="http://schemas.microsoft.com/office/powerpoint/2010/main" val="1512772814"/>
+      </p:ext>
+    </p:extLst>
   </p:cSld>
   <p:clrMapOvr>
     <a:masterClrMapping/>
   </p:clrMapOvr>
-  <mc:AlternateContent xmlns:mc="http://schemas.openxmlformats.org/markup-compatibility/2006">
-    <mc:Choice xmlns:p14="http://schemas.microsoft.com/office/powerpoint/2010/main" Requires="p14">
-      <p:transition xmlns:mc="http://schemas.openxmlformats.org/markup-compatibility/2006" xmlns:p14="http://schemas.microsoft.com/office/powerpoint/2010/main" mc:Ignorable="p14" p14:dur="500"/>
-    </mc:Choice>
-    <mc:Fallback>
-      <p:transition/>
-    </mc:Fallback>
-  </mc:AlternateContent>
+  <p:transition/>
 </p:sld>
 </file>
 
-<file path=ppt/slides/slide7.xml><?xml version="1.0" encoding="utf-8"?>
-<p:sld xmlns:r="http://schemas.openxmlformats.org/officeDocument/2006/relationships" xmlns:c="http://schemas.openxmlformats.org/drawingml/2006/chart" xmlns:a="http://schemas.openxmlformats.org/drawingml/2006/main" xmlns:dgm="http://schemas.openxmlformats.org/drawingml/2006/diagram" xmlns:dsp="http://schemas.microsoft.com/office/drawing/2008/diagram" xmlns:p="http://schemas.openxmlformats.org/presentationml/2006/main">
+<file path=ppt/slides/slide8.xml><?xml version="1.0" encoding="utf-8"?>
+<p:sld xmlns:a="http://schemas.openxmlformats.org/drawingml/2006/main" xmlns:r="http://schemas.openxmlformats.org/officeDocument/2006/relationships" xmlns:p="http://schemas.openxmlformats.org/presentationml/2006/main">
   <p:cSld>
     <p:spTree>
       <p:nvGrpSpPr>
@@ -4523,22 +4267,25 @@
             <a:spLocks noGrp="1"/>
           </p:cNvSpPr>
           <p:nvPr>
-            <p:ph type="title" idx="0"/>
-          </p:nvPr>
-        </p:nvSpPr>
-        <p:spPr/>
-        <p:txBody>
-          <a:bodyPr/>
-          <a:lstStyle/>
-          <a:p>
-            <a:pPr>
-              <a:defRPr/>
-            </a:pPr>
-            <a:r>
-              <a:rPr lang="ko-KR" altLang="en-US"/>
-              <a:t>정보 제공</a:t>
-            </a:r>
-            <a:endParaRPr lang="ko-KR" altLang="en-US"/>
+            <p:ph type="title"/>
+          </p:nvPr>
+        </p:nvSpPr>
+        <p:spPr/>
+        <p:txBody>
+          <a:bodyPr/>
+          <a:lstStyle/>
+          <a:p>
+            <a:pPr lvl="0">
+              <a:defRPr/>
+            </a:pPr>
+            <a:r>
+              <a:rPr lang="ko-KR" altLang="en-US" dirty="0" err="1"/>
+              <a:t>배드</a:t>
+            </a:r>
+            <a:r>
+              <a:rPr lang="ko-KR" altLang="en-US" dirty="0"/>
+              <a:t> 엔딩</a:t>
+            </a:r>
           </a:p>
         </p:txBody>
       </p:sp>
@@ -4554,33 +4301,81 @@
         </p:nvSpPr>
         <p:spPr/>
         <p:txBody>
-          <a:bodyPr/>
-          <a:lstStyle/>
-          <a:p>
-            <a:pPr lvl="0">
-              <a:defRPr/>
-            </a:pPr>
-            <a:r>
-              <a:rPr lang="ko-KR" altLang="en-US"/>
-              <a:t>주인공이 어디서 입장하는지를 알려줘야 함. </a:t>
-            </a:r>
-            <a:endParaRPr lang="ko-KR" altLang="en-US"/>
-          </a:p>
-          <a:p>
-            <a:pPr lvl="0">
-              <a:defRPr/>
-            </a:pPr>
-            <a:endParaRPr lang="ko-KR" altLang="en-US"/>
-          </a:p>
-          <a:p>
-            <a:pPr lvl="0">
-              <a:defRPr/>
-            </a:pPr>
-            <a:r>
-              <a:rPr lang="ko-KR" altLang="en-US"/>
-              <a:t>주인공의 할 일 목록과 대화 로그를 보여줘서 어떤 방향으로 유도할지힌트를 제공.</a:t>
-            </a:r>
-            <a:endParaRPr lang="ko-KR" altLang="en-US"/>
+          <a:bodyPr>
+            <a:normAutofit lnSpcReduction="10000"/>
+          </a:bodyPr>
+          <a:lstStyle/>
+          <a:p>
+            <a:pPr lvl="0">
+              <a:defRPr/>
+            </a:pPr>
+            <a:r>
+              <a:rPr lang="ko-KR" altLang="en-US" dirty="0" err="1"/>
+              <a:t>배드</a:t>
+            </a:r>
+            <a:r>
+              <a:rPr lang="ko-KR" altLang="en-US" dirty="0"/>
+              <a:t> 엔딩의 기준은 플레이어의 개입이 너무 커 원래라면 불가능한 일이 생기거나 주인공의 목표를 이룰 수 없는 상태가 되는 것</a:t>
+            </a:r>
+            <a:r>
+              <a:rPr lang="en-US" altLang="ko-KR" dirty="0"/>
+              <a:t>.</a:t>
+            </a:r>
+          </a:p>
+          <a:p>
+            <a:pPr lvl="0">
+              <a:defRPr/>
+            </a:pPr>
+            <a:endParaRPr lang="en-US" altLang="ko-KR" dirty="0"/>
+          </a:p>
+          <a:p>
+            <a:pPr lvl="0">
+              <a:defRPr/>
+            </a:pPr>
+            <a:r>
+              <a:rPr lang="ko-KR" altLang="en-US" dirty="0" err="1"/>
+              <a:t>배드</a:t>
+            </a:r>
+            <a:r>
+              <a:rPr lang="ko-KR" altLang="en-US" dirty="0"/>
+              <a:t> 엔딩 시나리오를 만들어야 하긴 하지만 분기기 끊기기 때문에 작업량이 훨씬 덜함</a:t>
+            </a:r>
+            <a:r>
+              <a:rPr lang="en-US" altLang="ko-KR" dirty="0"/>
+              <a:t>.</a:t>
+            </a:r>
+          </a:p>
+          <a:p>
+            <a:pPr lvl="0">
+              <a:defRPr/>
+            </a:pPr>
+            <a:endParaRPr lang="en-US" altLang="ko-KR" dirty="0"/>
+          </a:p>
+          <a:p>
+            <a:pPr lvl="0">
+              <a:defRPr/>
+            </a:pPr>
+            <a:r>
+              <a:rPr lang="ko-KR" altLang="en-US" dirty="0"/>
+              <a:t>단 모든 </a:t>
+            </a:r>
+            <a:r>
+              <a:rPr lang="ko-KR" altLang="en-US" dirty="0" err="1"/>
+              <a:t>배드</a:t>
+            </a:r>
+            <a:r>
+              <a:rPr lang="ko-KR" altLang="en-US" dirty="0"/>
+              <a:t> 엔딩 제외 모든 분기에서 </a:t>
+            </a:r>
+            <a:r>
+              <a:rPr lang="ko-KR" altLang="en-US" dirty="0" err="1"/>
+              <a:t>진엔딩에</a:t>
+            </a:r>
+            <a:r>
+              <a:rPr lang="ko-KR" altLang="en-US" dirty="0"/>
+              <a:t> 갈 수 있어야 함</a:t>
+            </a:r>
+            <a:endParaRPr lang="en-US" altLang="ko-KR" dirty="0"/>
           </a:p>
         </p:txBody>
       </p:sp>
@@ -4589,19 +4384,19 @@
   <p:clrMapOvr>
     <a:masterClrMapping/>
   </p:clrMapOvr>
-  <mc:AlternateContent xmlns:mc="http://schemas.openxmlformats.org/markup-compatibility/2006">
-    <mc:Choice xmlns:p14="http://schemas.microsoft.com/office/powerpoint/2010/main" Requires="p14">
-      <p:transition xmlns:mc="http://schemas.openxmlformats.org/markup-compatibility/2006" xmlns:p14="http://schemas.microsoft.com/office/powerpoint/2010/main" mc:Ignorable="p14" p14:dur="500"/>
+  <mc:AlternateContent xmlns:mc="http://schemas.openxmlformats.org/markup-compatibility/2006" xmlns:p14="http://schemas.microsoft.com/office/powerpoint/2010/main">
+    <mc:Choice Requires="p14">
+      <p:transition/>
     </mc:Choice>
-    <mc:Fallback>
+    <mc:Fallback xmlns:dsp="http://schemas.microsoft.com/office/drawing/2008/diagram" xmlns:dgm="http://schemas.openxmlformats.org/drawingml/2006/diagram" xmlns:c="http://schemas.openxmlformats.org/drawingml/2006/chart" xmlns="">
       <p:transition/>
     </mc:Fallback>
   </mc:AlternateContent>
 </p:sld>
 </file>
 
-<file path=ppt/slides/slide8.xml><?xml version="1.0" encoding="utf-8"?>
-<p:sld xmlns:r="http://schemas.openxmlformats.org/officeDocument/2006/relationships" xmlns:c="http://schemas.openxmlformats.org/drawingml/2006/chart" xmlns:a="http://schemas.openxmlformats.org/drawingml/2006/main" xmlns:dgm="http://schemas.openxmlformats.org/drawingml/2006/diagram" xmlns:dsp="http://schemas.microsoft.com/office/drawing/2008/diagram" xmlns:p="http://schemas.openxmlformats.org/presentationml/2006/main">
+<file path=ppt/slides/slide9.xml><?xml version="1.0" encoding="utf-8"?>
+<p:sld xmlns:a="http://schemas.openxmlformats.org/drawingml/2006/main" xmlns:r="http://schemas.openxmlformats.org/officeDocument/2006/relationships" xmlns:p="http://schemas.openxmlformats.org/presentationml/2006/main">
   <p:cSld>
     <p:spTree>
       <p:nvGrpSpPr>
@@ -4624,30 +4419,21 @@
             <a:spLocks noGrp="1"/>
           </p:cNvSpPr>
           <p:nvPr>
-            <p:ph type="title" idx="0"/>
-          </p:nvPr>
-        </p:nvSpPr>
-        <p:spPr/>
-        <p:txBody>
-          <a:bodyPr/>
-          <a:lstStyle/>
-          <a:p>
-            <a:pPr lvl="0">
-              <a:defRPr/>
-            </a:pPr>
-            <a:r>
-              <a:rPr lang="ko-KR" altLang="en-US"/>
-              <a:t>예시 </a:t>
-            </a:r>
-            <a:r>
-              <a:rPr lang="en-US" altLang="ko-KR"/>
-              <a:t>: </a:t>
-            </a:r>
-            <a:r>
-              <a:rPr lang="ko-KR" altLang="en-US"/>
-              <a:t>열쇠 찾기</a:t>
-            </a:r>
-            <a:endParaRPr lang="ko-KR" altLang="en-US"/>
+            <p:ph type="title"/>
+          </p:nvPr>
+        </p:nvSpPr>
+        <p:spPr/>
+        <p:txBody>
+          <a:bodyPr/>
+          <a:lstStyle/>
+          <a:p>
+            <a:pPr>
+              <a:defRPr/>
+            </a:pPr>
+            <a:r>
+              <a:rPr lang="ko-KR" altLang="en-US"/>
+              <a:t>결론</a:t>
+            </a:r>
           </a:p>
         </p:txBody>
       </p:sp>
@@ -4666,94 +4452,44 @@
           <a:bodyPr/>
           <a:lstStyle/>
           <a:p>
-            <a:pPr lvl="0">
-              <a:defRPr/>
-            </a:pPr>
-            <a:r>
-              <a:rPr lang="ko-KR" altLang="en-US"/>
-              <a:t>날씨 </a:t>
-            </a:r>
-            <a:r>
-              <a:rPr lang="en-US" altLang="ko-KR"/>
-              <a:t>: </a:t>
-            </a:r>
-            <a:r>
-              <a:rPr lang="ko-KR" altLang="en-US"/>
-              <a:t>비가 오게 해서 특정 건물 안에 들어가게 유도</a:t>
-            </a:r>
-            <a:endParaRPr lang="ko-KR" altLang="en-US"/>
-          </a:p>
-          <a:p>
-            <a:pPr lvl="0">
-              <a:defRPr/>
-            </a:pPr>
-            <a:endParaRPr lang="en-US" altLang="ko-KR"/>
-          </a:p>
-          <a:p>
-            <a:pPr lvl="0">
-              <a:defRPr/>
-            </a:pPr>
-            <a:r>
-              <a:rPr lang="ko-KR" altLang="en-US"/>
-              <a:t>빛 </a:t>
-            </a:r>
-            <a:r>
-              <a:rPr lang="en-US" altLang="ko-KR"/>
-              <a:t>: </a:t>
-            </a:r>
-            <a:r>
-              <a:rPr lang="ko-KR" altLang="en-US"/>
-              <a:t>열쇠가 있는 쪽에 빛을 비춰서 찾기 쉽도록 함</a:t>
-            </a:r>
-            <a:r>
-              <a:rPr lang="en-US" altLang="ko-KR"/>
-              <a:t>. </a:t>
-            </a:r>
-            <a:r>
-              <a:rPr lang="ko-KR" altLang="en-US"/>
-              <a:t>이때 잘 보이는 열쇠를 표현해야 함</a:t>
-            </a:r>
-            <a:r>
-              <a:rPr lang="en-US" altLang="ko-KR"/>
+            <a:pPr>
+              <a:defRPr/>
+            </a:pPr>
+            <a:r>
+              <a:rPr lang="ko-KR" altLang="en-US" dirty="0"/>
+              <a:t>계획 모드에서 플레이어가 어떤 선택을 했을 경우 기대하는 결과를 보여줘야 한다</a:t>
+            </a:r>
+            <a:r>
+              <a:rPr lang="en-US" altLang="ko-KR" dirty="0"/>
               <a:t>.</a:t>
             </a:r>
-            <a:endParaRPr lang="en-US" altLang="ko-KR"/>
-          </a:p>
-          <a:p>
-            <a:pPr lvl="0">
-              <a:defRPr/>
-            </a:pPr>
-            <a:endParaRPr lang="en-US" altLang="ko-KR"/>
-          </a:p>
-          <a:p>
-            <a:pPr lvl="0">
-              <a:defRPr/>
-            </a:pPr>
-            <a:r>
-              <a:rPr lang="ko-KR" altLang="en-US"/>
-              <a:t>소리 </a:t>
-            </a:r>
-            <a:r>
-              <a:rPr lang="en-US" altLang="ko-KR"/>
-              <a:t>: </a:t>
-            </a:r>
-            <a:r>
-              <a:rPr lang="ko-KR" altLang="en-US"/>
-              <a:t>열쇠가 있는 쪽에 소리를 내서 찾도록 유도할 수도 있음</a:t>
-            </a:r>
-            <a:r>
-              <a:rPr lang="en-US" altLang="ko-KR"/>
-              <a:t>. </a:t>
-            </a:r>
-            <a:r>
-              <a:rPr lang="ko-KR" altLang="en-US"/>
-              <a:t>이때도 소리를 재생해서 어떤 사건이 일어나는지를 알 수 있게 해야 함</a:t>
-            </a:r>
-            <a:r>
-              <a:rPr lang="en-US" altLang="ko-KR"/>
+            <a:r>
+              <a:rPr lang="ko-KR" altLang="en-US" dirty="0"/>
+              <a:t> 우린 그걸 예측하거나 만들어야 한다</a:t>
+            </a:r>
+            <a:r>
+              <a:rPr lang="en-US" altLang="ko-KR" dirty="0"/>
               <a:t>.</a:t>
             </a:r>
-            <a:endParaRPr lang="ko-KR" altLang="en-US"/>
+          </a:p>
+          <a:p>
+            <a:pPr>
+              <a:defRPr/>
+            </a:pPr>
+            <a:endParaRPr lang="en-US" altLang="ko-KR" dirty="0"/>
+          </a:p>
+          <a:p>
+            <a:pPr>
+              <a:defRPr/>
+            </a:pPr>
+            <a:r>
+              <a:rPr lang="ko-KR" altLang="en-US" dirty="0"/>
+              <a:t>죽음과 다시하기를 통해 분기를 줄일 수 있다</a:t>
+            </a:r>
+            <a:r>
+              <a:rPr lang="en-US" altLang="ko-KR" dirty="0"/>
+              <a:t>.</a:t>
+            </a:r>
           </a:p>
         </p:txBody>
       </p:sp>
@@ -4762,142 +4498,11 @@
   <p:clrMapOvr>
     <a:masterClrMapping/>
   </p:clrMapOvr>
-  <mc:AlternateContent xmlns:mc="http://schemas.openxmlformats.org/markup-compatibility/2006">
-    <mc:Choice xmlns:p14="http://schemas.microsoft.com/office/powerpoint/2010/main" Requires="p14">
-      <p:transition xmlns:mc="http://schemas.openxmlformats.org/markup-compatibility/2006" xmlns:p14="http://schemas.microsoft.com/office/powerpoint/2010/main" mc:Ignorable="p14" p14:dur="500"/>
+  <mc:AlternateContent xmlns:mc="http://schemas.openxmlformats.org/markup-compatibility/2006" xmlns:p14="http://schemas.microsoft.com/office/powerpoint/2010/main">
+    <mc:Choice Requires="p14">
+      <p:transition/>
     </mc:Choice>
-    <mc:Fallback>
-      <p:transition/>
-    </mc:Fallback>
-  </mc:AlternateContent>
-</p:sld>
-</file>
-
-<file path=ppt/slides/slide9.xml><?xml version="1.0" encoding="utf-8"?>
-<p:sld xmlns:r="http://schemas.openxmlformats.org/officeDocument/2006/relationships" xmlns:c="http://schemas.openxmlformats.org/drawingml/2006/chart" xmlns:a="http://schemas.openxmlformats.org/drawingml/2006/main" xmlns:dgm="http://schemas.openxmlformats.org/drawingml/2006/diagram" xmlns:dsp="http://schemas.microsoft.com/office/drawing/2008/diagram" xmlns:p="http://schemas.openxmlformats.org/presentationml/2006/main">
-  <p:cSld>
-    <p:spTree>
-      <p:nvGrpSpPr>
-        <p:cNvPr id="1" name=""/>
-        <p:cNvGrpSpPr/>
-        <p:nvPr/>
-      </p:nvGrpSpPr>
-      <p:grpSpPr>
-        <a:xfrm>
-          <a:off x="0" y="0"/>
-          <a:ext cx="0" cy="0"/>
-          <a:chOff x="0" y="0"/>
-          <a:chExt cx="0" cy="0"/>
-        </a:xfrm>
-      </p:grpSpPr>
-      <p:sp>
-        <p:nvSpPr>
-          <p:cNvPr id="2" name="제목 1"/>
-          <p:cNvSpPr>
-            <a:spLocks noGrp="1"/>
-          </p:cNvSpPr>
-          <p:nvPr>
-            <p:ph type="title" idx="0"/>
-          </p:nvPr>
-        </p:nvSpPr>
-        <p:spPr/>
-        <p:txBody>
-          <a:bodyPr/>
-          <a:lstStyle/>
-          <a:p>
-            <a:pPr lvl="0">
-              <a:defRPr/>
-            </a:pPr>
-            <a:r>
-              <a:rPr lang="ko-KR" altLang="en-US"/>
-              <a:t>죽음과 다시하기</a:t>
-            </a:r>
-            <a:endParaRPr lang="ko-KR" altLang="en-US"/>
-          </a:p>
-        </p:txBody>
-      </p:sp>
-      <p:sp>
-        <p:nvSpPr>
-          <p:cNvPr id="3" name="내용 개체 틀 2"/>
-          <p:cNvSpPr>
-            <a:spLocks noGrp="1"/>
-          </p:cNvSpPr>
-          <p:nvPr>
-            <p:ph idx="1"/>
-          </p:nvPr>
-        </p:nvSpPr>
-        <p:spPr/>
-        <p:txBody>
-          <a:bodyPr>
-            <a:normAutofit/>
-          </a:bodyPr>
-          <a:lstStyle/>
-          <a:p>
-            <a:pPr lvl="0">
-              <a:defRPr/>
-            </a:pPr>
-            <a:r>
-              <a:rPr lang="ko-KR" altLang="en-US"/>
-              <a:t>원래는 죽음과 다시하기라는 개념 없이 게임을 만드려했는데 이 경우 엄청난 수의 분기가 필요</a:t>
-            </a:r>
-            <a:r>
-              <a:rPr lang="en-US" altLang="ko-KR"/>
-              <a:t>.</a:t>
-            </a:r>
-            <a:endParaRPr lang="en-US" altLang="ko-KR"/>
-          </a:p>
-          <a:p>
-            <a:pPr lvl="0">
-              <a:defRPr/>
-            </a:pPr>
-            <a:endParaRPr lang="en-US" altLang="ko-KR"/>
-          </a:p>
-          <a:p>
-            <a:pPr lvl="0">
-              <a:defRPr/>
-            </a:pPr>
-            <a:r>
-              <a:rPr lang="ko-KR" altLang="en-US"/>
-              <a:t>선형적인 스토리에 집중하는 게임인데 너무 많은 분기를 만들면 몇몇 파트의 밀도나 퀄리티도 떨어질 수 있음</a:t>
-            </a:r>
-            <a:r>
-              <a:rPr lang="en-US" altLang="ko-KR"/>
-              <a:t>.</a:t>
-            </a:r>
-            <a:endParaRPr lang="en-US" altLang="ko-KR"/>
-          </a:p>
-          <a:p>
-            <a:pPr lvl="0">
-              <a:defRPr/>
-            </a:pPr>
-            <a:endParaRPr lang="en-US" altLang="ko-KR"/>
-          </a:p>
-          <a:p>
-            <a:pPr lvl="0">
-              <a:defRPr/>
-            </a:pPr>
-            <a:r>
-              <a:rPr lang="ko-KR" altLang="en-US"/>
-              <a:t>그래서 생존과 죽음이라는 개념을 넣을까 생각 중</a:t>
-            </a:r>
-            <a:r>
-              <a:rPr lang="en-US" altLang="ko-KR"/>
-              <a:t>.</a:t>
-            </a:r>
-            <a:endParaRPr lang="en-US" altLang="ko-KR"/>
-          </a:p>
-        </p:txBody>
-      </p:sp>
-    </p:spTree>
-  </p:cSld>
-  <p:clrMapOvr>
-    <a:masterClrMapping/>
-  </p:clrMapOvr>
-  <mc:AlternateContent xmlns:mc="http://schemas.openxmlformats.org/markup-compatibility/2006">
-    <mc:Choice xmlns:p14="http://schemas.microsoft.com/office/powerpoint/2010/main" Requires="p14">
-      <p:transition xmlns:mc="http://schemas.openxmlformats.org/markup-compatibility/2006" xmlns:p14="http://schemas.microsoft.com/office/powerpoint/2010/main" mc:Ignorable="p14" p14:dur="500"/>
-    </mc:Choice>
-    <mc:Fallback>
+    <mc:Fallback xmlns:dsp="http://schemas.microsoft.com/office/drawing/2008/diagram" xmlns:dgm="http://schemas.openxmlformats.org/drawingml/2006/diagram" xmlns:c="http://schemas.openxmlformats.org/drawingml/2006/chart" xmlns="">
       <p:transition/>
     </mc:Fallback>
   </mc:AlternateContent>
@@ -4905,41 +4510,41 @@
 </file>
 
 <file path=ppt/theme/theme1.xml><?xml version="1.0" encoding="utf-8"?>
-<a:theme xmlns:r="http://schemas.openxmlformats.org/officeDocument/2006/relationships" xmlns:c="http://schemas.openxmlformats.org/drawingml/2006/chart" xmlns:dgm="http://schemas.openxmlformats.org/drawingml/2006/diagram" xmlns:dsp="http://schemas.microsoft.com/office/drawing/2008/diagram" xmlns:a="http://schemas.openxmlformats.org/drawingml/2006/main" xmlns:pic="http://schemas.openxmlformats.org/drawingml/2006/picture" xmlns:wp="http://schemas.openxmlformats.org/drawingml/2006/wordprocessingDrawing" xmlns:xdr="http://schemas.openxmlformats.org/drawingml/2006/spreadsheetDrawing" xmlns:lc="http://schemas.openxmlformats.org/drawingml/2006/lockedCanvas" xmlns:p="http://schemas.openxmlformats.org/presentationml/2006/main" name="한컴오피스">
+<a:theme xmlns:a="http://schemas.openxmlformats.org/drawingml/2006/main" name="한컴오피스">
   <a:themeElements>
     <a:clrScheme name="한컴오피스">
       <a:dk1>
         <a:sysClr val="windowText" lastClr="000000"/>
       </a:dk1>
       <a:lt1>
-        <a:sysClr val="window" lastClr="ffffff"/>
+        <a:sysClr val="window" lastClr="FFFFFF"/>
       </a:lt1>
       <a:dk2>
-        <a:srgbClr val="3a3c84"/>
+        <a:srgbClr val="3A3C84"/>
       </a:dk2>
       <a:lt2>
-        <a:srgbClr val="faf3db"/>
+        <a:srgbClr val="FAF3DB"/>
       </a:lt2>
       <a:accent1>
-        <a:srgbClr val="6182d6"/>
+        <a:srgbClr val="6182D6"/>
       </a:accent1>
       <a:accent2>
-        <a:srgbClr val="ff843a"/>
+        <a:srgbClr val="FF843A"/>
       </a:accent2>
       <a:accent3>
-        <a:srgbClr val="b2b2b2"/>
+        <a:srgbClr val="B2B2B2"/>
       </a:accent3>
       <a:accent4>
-        <a:srgbClr val="ffd700"/>
+        <a:srgbClr val="FFD700"/>
       </a:accent4>
       <a:accent5>
-        <a:srgbClr val="289b6e"/>
+        <a:srgbClr val="289B6E"/>
       </a:accent5>
       <a:accent6>
-        <a:srgbClr val="9d5cbb"/>
+        <a:srgbClr val="9D5CBB"/>
       </a:accent6>
       <a:hlink>
-        <a:srgbClr val="0000ff"/>
+        <a:srgbClr val="0000FF"/>
       </a:hlink>
       <a:folHlink>
         <a:srgbClr val="800080"/>
@@ -5164,5 +4769,7 @@
       </a:bgFillStyleLst>
     </a:fmtScheme>
   </a:themeElements>
+  <a:objectDefaults/>
+  <a:extraClrSchemeLst/>
 </a:theme>
 </file>
</xml_diff>